<commit_message>
Revert "Merge branch 'GUI'"
This reverts commit c25892339bceef36139e1c43a107fa779caa19ed, reversing
changes made to a2e3263d0bb1bfc3188f90c2b7e6137e1e3504b7.
</commit_message>
<xml_diff>
--- a/modeller, dokumenter/præs2.pptx
+++ b/modeller, dokumenter/præs2.pptx
@@ -13,8 +13,7 @@
     <p:sldId id="261" r:id="rId7"/>
     <p:sldId id="262" r:id="rId8"/>
     <p:sldId id="263" r:id="rId9"/>
-    <p:sldId id="266" r:id="rId10"/>
-    <p:sldId id="264" r:id="rId11"/>
+    <p:sldId id="264" r:id="rId10"/>
   </p:sldIdLst>
   <p:sldSz cx="12192000" cy="6858000"/>
   <p:notesSz cx="6858000" cy="9144000"/>
@@ -126,7 +125,6 @@
             <p14:sldId id="261"/>
             <p14:sldId id="262"/>
             <p14:sldId id="263"/>
-            <p14:sldId id="266"/>
             <p14:sldId id="264"/>
           </p14:sldIdLst>
         </p14:section>
@@ -135,108 +133,12 @@
         </p14:section>
       </p14:sectionLst>
     </p:ext>
-    <p:ext uri="{EFAFB233-063F-42B5-8137-9DF3F51BA10A}">
-      <p15:sldGuideLst xmlns:p15="http://schemas.microsoft.com/office/powerpoint/2012/main"/>
-    </p:ext>
   </p:extLst>
 </p:presentation>
 </file>
 
 <file path=ppt/changesInfos/changesInfo1.xml><?xml version="1.0" encoding="utf-8"?>
 <pc:chgInfo xmlns:a="http://schemas.openxmlformats.org/drawingml/2006/main" xmlns:r="http://schemas.openxmlformats.org/officeDocument/2006/relationships" xmlns:ac="http://schemas.microsoft.com/office/drawing/2013/main/command" xmlns:pc="http://schemas.microsoft.com/office/powerpoint/2013/main/command">
-  <pc:docChgLst>
-    <pc:chgData name="Sofie Blom Jensen" userId="57dd88df5c73f059" providerId="LiveId" clId="{1FFA8421-6C34-4F90-8C55-20FEE3EA44FC}"/>
-    <pc:docChg chg="custSel addSld delSld modSld modSection">
-      <pc:chgData name="Sofie Blom Jensen" userId="57dd88df5c73f059" providerId="LiveId" clId="{1FFA8421-6C34-4F90-8C55-20FEE3EA44FC}" dt="2018-05-16T11:19:46.144" v="70" actId="1076"/>
-      <pc:docMkLst>
-        <pc:docMk/>
-      </pc:docMkLst>
-      <pc:sldChg chg="delSp modSp">
-        <pc:chgData name="Sofie Blom Jensen" userId="57dd88df5c73f059" providerId="LiveId" clId="{1FFA8421-6C34-4F90-8C55-20FEE3EA44FC}" dt="2018-05-16T11:19:46.144" v="70" actId="1076"/>
-        <pc:sldMkLst>
-          <pc:docMk/>
-          <pc:sldMk cId="851147619" sldId="258"/>
-        </pc:sldMkLst>
-        <pc:spChg chg="mod">
-          <ac:chgData name="Sofie Blom Jensen" userId="57dd88df5c73f059" providerId="LiveId" clId="{1FFA8421-6C34-4F90-8C55-20FEE3EA44FC}" dt="2018-05-16T11:19:46.144" v="70" actId="1076"/>
-          <ac:spMkLst>
-            <pc:docMk/>
-            <pc:sldMk cId="851147619" sldId="258"/>
-            <ac:spMk id="2" creationId="{1F470198-D928-4A81-887F-4629C6CD432C}"/>
-          </ac:spMkLst>
-        </pc:spChg>
-        <pc:spChg chg="del">
-          <ac:chgData name="Sofie Blom Jensen" userId="57dd88df5c73f059" providerId="LiveId" clId="{1FFA8421-6C34-4F90-8C55-20FEE3EA44FC}" dt="2018-05-16T11:19:17.083" v="60" actId="478"/>
-          <ac:spMkLst>
-            <pc:docMk/>
-            <pc:sldMk cId="851147619" sldId="258"/>
-            <ac:spMk id="3" creationId="{D557E203-79F8-4145-B653-8FF850EDD5ED}"/>
-          </ac:spMkLst>
-        </pc:spChg>
-        <pc:picChg chg="mod">
-          <ac:chgData name="Sofie Blom Jensen" userId="57dd88df5c73f059" providerId="LiveId" clId="{1FFA8421-6C34-4F90-8C55-20FEE3EA44FC}" dt="2018-05-16T11:19:31.476" v="65" actId="14100"/>
-          <ac:picMkLst>
-            <pc:docMk/>
-            <pc:sldMk cId="851147619" sldId="258"/>
-            <ac:picMk id="5" creationId="{ECE6BD11-4767-41B9-9FBF-A78A2513A052}"/>
-          </ac:picMkLst>
-        </pc:picChg>
-      </pc:sldChg>
-      <pc:sldChg chg="addSp delSp modSp">
-        <pc:chgData name="Sofie Blom Jensen" userId="57dd88df5c73f059" providerId="LiveId" clId="{1FFA8421-6C34-4F90-8C55-20FEE3EA44FC}" dt="2018-05-16T11:16:28.816" v="50" actId="1076"/>
-        <pc:sldMkLst>
-          <pc:docMk/>
-          <pc:sldMk cId="3054669827" sldId="264"/>
-        </pc:sldMkLst>
-        <pc:spChg chg="mod">
-          <ac:chgData name="Sofie Blom Jensen" userId="57dd88df5c73f059" providerId="LiveId" clId="{1FFA8421-6C34-4F90-8C55-20FEE3EA44FC}" dt="2018-05-16T11:16:28.816" v="50" actId="1076"/>
-          <ac:spMkLst>
-            <pc:docMk/>
-            <pc:sldMk cId="3054669827" sldId="264"/>
-            <ac:spMk id="2" creationId="{E870BB39-3894-404C-9070-6172E1BBFABA}"/>
-          </ac:spMkLst>
-        </pc:spChg>
-        <pc:spChg chg="del mod">
-          <ac:chgData name="Sofie Blom Jensen" userId="57dd88df5c73f059" providerId="LiveId" clId="{1FFA8421-6C34-4F90-8C55-20FEE3EA44FC}" dt="2018-05-16T11:15:40.463" v="23" actId="478"/>
-          <ac:spMkLst>
-            <pc:docMk/>
-            <pc:sldMk cId="3054669827" sldId="264"/>
-            <ac:spMk id="3" creationId="{A94538EA-8428-40C4-895F-174FF806A46B}"/>
-          </ac:spMkLst>
-        </pc:spChg>
-        <pc:spChg chg="add del mod">
-          <ac:chgData name="Sofie Blom Jensen" userId="57dd88df5c73f059" providerId="LiveId" clId="{1FFA8421-6C34-4F90-8C55-20FEE3EA44FC}" dt="2018-05-16T11:15:43.193" v="24" actId="478"/>
-          <ac:spMkLst>
-            <pc:docMk/>
-            <pc:sldMk cId="3054669827" sldId="264"/>
-            <ac:spMk id="5" creationId="{34E77C0A-C53C-4F1A-A43A-EAC671D27611}"/>
-          </ac:spMkLst>
-        </pc:spChg>
-      </pc:sldChg>
-      <pc:sldChg chg="add del">
-        <pc:chgData name="Sofie Blom Jensen" userId="57dd88df5c73f059" providerId="LiveId" clId="{1FFA8421-6C34-4F90-8C55-20FEE3EA44FC}" dt="2018-05-16T11:18:23.738" v="53" actId="2696"/>
-        <pc:sldMkLst>
-          <pc:docMk/>
-          <pc:sldMk cId="794802110" sldId="265"/>
-        </pc:sldMkLst>
-      </pc:sldChg>
-      <pc:sldChg chg="modSp add">
-        <pc:chgData name="Sofie Blom Jensen" userId="57dd88df5c73f059" providerId="LiveId" clId="{1FFA8421-6C34-4F90-8C55-20FEE3EA44FC}" dt="2018-05-16T11:18:43.974" v="59" actId="1076"/>
-        <pc:sldMkLst>
-          <pc:docMk/>
-          <pc:sldMk cId="2833078342" sldId="266"/>
-        </pc:sldMkLst>
-        <pc:spChg chg="mod">
-          <ac:chgData name="Sofie Blom Jensen" userId="57dd88df5c73f059" providerId="LiveId" clId="{1FFA8421-6C34-4F90-8C55-20FEE3EA44FC}" dt="2018-05-16T11:18:43.974" v="59" actId="1076"/>
-          <ac:spMkLst>
-            <pc:docMk/>
-            <pc:sldMk cId="2833078342" sldId="266"/>
-            <ac:spMk id="2" creationId="{E870BB39-3894-404C-9070-6172E1BBFABA}"/>
-          </ac:spMkLst>
-        </pc:spChg>
-      </pc:sldChg>
-    </pc:docChg>
-  </pc:docChgLst>
   <pc:docChgLst>
     <pc:chgData name="Sofie Blom Jensen" userId="57dd88df5c73f059" providerId="LiveId" clId="{3BD1AEE2-106A-49B7-9DAA-D3DFD31DD576}"/>
     <pc:docChg chg="undo custSel addSld delSld modSld modSection">
@@ -784,7 +686,7 @@
           <a:noFill/>
           <a:extLst>
             <a:ext uri="{909E8E84-426E-40dd-AFC4-6F175D3DCCD1}">
-              <a14:hiddenFill xmlns="" xmlns:a14="http://schemas.microsoft.com/office/drawing/2010/main">
+              <a14:hiddenFill xmlns:a14="http://schemas.microsoft.com/office/drawing/2010/main" xmlns="">
                 <a:solidFill>
                   <a:srgbClr val="FFFFFF"/>
                 </a:solidFill>
@@ -843,7 +745,7 @@
             </a:ln>
             <a:extLst>
               <a:ext uri="{91240B29-F687-4f45-9708-019B960494DF}">
-                <a14:hiddenLine xmlns="" xmlns:a14="http://schemas.microsoft.com/office/drawing/2010/main" w="9525">
+                <a14:hiddenLine xmlns:a14="http://schemas.microsoft.com/office/drawing/2010/main" xmlns="" w="9525">
                   <a:solidFill>
                     <a:srgbClr val="000000"/>
                   </a:solidFill>
@@ -933,7 +835,7 @@
             </a:ln>
             <a:extLst>
               <a:ext uri="{91240B29-F687-4f45-9708-019B960494DF}">
-                <a14:hiddenLine xmlns="" xmlns:a14="http://schemas.microsoft.com/office/drawing/2010/main" w="9525">
+                <a14:hiddenLine xmlns:a14="http://schemas.microsoft.com/office/drawing/2010/main" xmlns="" w="9525">
                   <a:solidFill>
                     <a:srgbClr val="000000"/>
                   </a:solidFill>
@@ -1023,7 +925,7 @@
             </a:ln>
             <a:extLst>
               <a:ext uri="{91240B29-F687-4f45-9708-019B960494DF}">
-                <a14:hiddenLine xmlns="" xmlns:a14="http://schemas.microsoft.com/office/drawing/2010/main" w="9525">
+                <a14:hiddenLine xmlns:a14="http://schemas.microsoft.com/office/drawing/2010/main" xmlns="" w="9525">
                   <a:solidFill>
                     <a:srgbClr val="000000"/>
                   </a:solidFill>
@@ -1057,7 +959,7 @@
             </a:ln>
             <a:extLst>
               <a:ext uri="{91240B29-F687-4f45-9708-019B960494DF}">
-                <a14:hiddenLine xmlns="" xmlns:a14="http://schemas.microsoft.com/office/drawing/2010/main" w="9525">
+                <a14:hiddenLine xmlns:a14="http://schemas.microsoft.com/office/drawing/2010/main" xmlns="" w="9525">
                   <a:solidFill>
                     <a:srgbClr val="000000"/>
                   </a:solidFill>
@@ -1147,7 +1049,7 @@
             </a:ln>
             <a:extLst>
               <a:ext uri="{91240B29-F687-4f45-9708-019B960494DF}">
-                <a14:hiddenLine xmlns="" xmlns:a14="http://schemas.microsoft.com/office/drawing/2010/main" w="9525">
+                <a14:hiddenLine xmlns:a14="http://schemas.microsoft.com/office/drawing/2010/main" xmlns="" w="9525">
                   <a:solidFill>
                     <a:srgbClr val="000000"/>
                   </a:solidFill>
@@ -1209,7 +1111,7 @@
             </a:ln>
             <a:extLst>
               <a:ext uri="{91240B29-F687-4f45-9708-019B960494DF}">
-                <a14:hiddenLine xmlns="" xmlns:a14="http://schemas.microsoft.com/office/drawing/2010/main" w="9525">
+                <a14:hiddenLine xmlns:a14="http://schemas.microsoft.com/office/drawing/2010/main" xmlns="" w="9525">
                   <a:solidFill>
                     <a:srgbClr val="000000"/>
                   </a:solidFill>
@@ -1271,7 +1173,7 @@
             </a:ln>
             <a:extLst>
               <a:ext uri="{91240B29-F687-4f45-9708-019B960494DF}">
-                <a14:hiddenLine xmlns="" xmlns:a14="http://schemas.microsoft.com/office/drawing/2010/main" w="9525">
+                <a14:hiddenLine xmlns:a14="http://schemas.microsoft.com/office/drawing/2010/main" xmlns="" w="9525">
                   <a:solidFill>
                     <a:srgbClr val="000000"/>
                   </a:solidFill>
@@ -1361,7 +1263,7 @@
             </a:ln>
             <a:extLst>
               <a:ext uri="{91240B29-F687-4f45-9708-019B960494DF}">
-                <a14:hiddenLine xmlns="" xmlns:a14="http://schemas.microsoft.com/office/drawing/2010/main" w="9525">
+                <a14:hiddenLine xmlns:a14="http://schemas.microsoft.com/office/drawing/2010/main" xmlns="" w="9525">
                   <a:solidFill>
                     <a:srgbClr val="000000"/>
                   </a:solidFill>
@@ -1423,7 +1325,7 @@
             </a:ln>
             <a:extLst>
               <a:ext uri="{91240B29-F687-4f45-9708-019B960494DF}">
-                <a14:hiddenLine xmlns="" xmlns:a14="http://schemas.microsoft.com/office/drawing/2010/main" w="9525">
+                <a14:hiddenLine xmlns:a14="http://schemas.microsoft.com/office/drawing/2010/main" xmlns="" w="9525">
                   <a:solidFill>
                     <a:srgbClr val="000000"/>
                   </a:solidFill>
@@ -1485,7 +1387,7 @@
             </a:ln>
             <a:extLst>
               <a:ext uri="{91240B29-F687-4f45-9708-019B960494DF}">
-                <a14:hiddenLine xmlns="" xmlns:a14="http://schemas.microsoft.com/office/drawing/2010/main" w="9525">
+                <a14:hiddenLine xmlns:a14="http://schemas.microsoft.com/office/drawing/2010/main" xmlns="" w="9525">
                   <a:solidFill>
                     <a:srgbClr val="000000"/>
                   </a:solidFill>
@@ -1575,7 +1477,7 @@
             </a:ln>
             <a:extLst>
               <a:ext uri="{91240B29-F687-4f45-9708-019B960494DF}">
-                <a14:hiddenLine xmlns="" xmlns:a14="http://schemas.microsoft.com/office/drawing/2010/main" w="9525">
+                <a14:hiddenLine xmlns:a14="http://schemas.microsoft.com/office/drawing/2010/main" xmlns="" w="9525">
                   <a:solidFill>
                     <a:srgbClr val="000000"/>
                   </a:solidFill>
@@ -1665,7 +1567,7 @@
             </a:ln>
             <a:extLst>
               <a:ext uri="{91240B29-F687-4f45-9708-019B960494DF}">
-                <a14:hiddenLine xmlns="" xmlns:a14="http://schemas.microsoft.com/office/drawing/2010/main" w="9525">
+                <a14:hiddenLine xmlns:a14="http://schemas.microsoft.com/office/drawing/2010/main" xmlns="" w="9525">
                   <a:solidFill>
                     <a:srgbClr val="000000"/>
                   </a:solidFill>
@@ -1727,7 +1629,7 @@
             </a:ln>
             <a:extLst>
               <a:ext uri="{91240B29-F687-4f45-9708-019B960494DF}">
-                <a14:hiddenLine xmlns="" xmlns:a14="http://schemas.microsoft.com/office/drawing/2010/main" w="9525">
+                <a14:hiddenLine xmlns:a14="http://schemas.microsoft.com/office/drawing/2010/main" xmlns="" w="9525">
                   <a:solidFill>
                     <a:srgbClr val="000000"/>
                   </a:solidFill>
@@ -1837,7 +1739,7 @@
             </a:ln>
             <a:extLst>
               <a:ext uri="{91240B29-F687-4f45-9708-019B960494DF}">
-                <a14:hiddenLine xmlns="" xmlns:a14="http://schemas.microsoft.com/office/drawing/2010/main" w="9525">
+                <a14:hiddenLine xmlns:a14="http://schemas.microsoft.com/office/drawing/2010/main" xmlns="" w="9525">
                   <a:solidFill>
                     <a:srgbClr val="000000"/>
                   </a:solidFill>
@@ -1899,7 +1801,7 @@
             </a:ln>
             <a:extLst>
               <a:ext uri="{91240B29-F687-4f45-9708-019B960494DF}">
-                <a14:hiddenLine xmlns="" xmlns:a14="http://schemas.microsoft.com/office/drawing/2010/main" w="9525">
+                <a14:hiddenLine xmlns:a14="http://schemas.microsoft.com/office/drawing/2010/main" xmlns="" w="9525">
                   <a:solidFill>
                     <a:srgbClr val="000000"/>
                   </a:solidFill>
@@ -1989,7 +1891,7 @@
             </a:ln>
             <a:extLst>
               <a:ext uri="{91240B29-F687-4f45-9708-019B960494DF}">
-                <a14:hiddenLine xmlns="" xmlns:a14="http://schemas.microsoft.com/office/drawing/2010/main" w="9525">
+                <a14:hiddenLine xmlns:a14="http://schemas.microsoft.com/office/drawing/2010/main" xmlns="" w="9525">
                   <a:solidFill>
                     <a:srgbClr val="000000"/>
                   </a:solidFill>
@@ -2079,7 +1981,7 @@
             </a:ln>
             <a:extLst>
               <a:ext uri="{91240B29-F687-4f45-9708-019B960494DF}">
-                <a14:hiddenLine xmlns="" xmlns:a14="http://schemas.microsoft.com/office/drawing/2010/main" w="9525">
+                <a14:hiddenLine xmlns:a14="http://schemas.microsoft.com/office/drawing/2010/main" xmlns="" w="9525">
                   <a:solidFill>
                     <a:srgbClr val="000000"/>
                   </a:solidFill>
@@ -2141,7 +2043,7 @@
             </a:ln>
             <a:extLst>
               <a:ext uri="{91240B29-F687-4f45-9708-019B960494DF}">
-                <a14:hiddenLine xmlns="" xmlns:a14="http://schemas.microsoft.com/office/drawing/2010/main" w="9525">
+                <a14:hiddenLine xmlns:a14="http://schemas.microsoft.com/office/drawing/2010/main" xmlns="" w="9525">
                   <a:solidFill>
                     <a:srgbClr val="000000"/>
                   </a:solidFill>
@@ -2231,7 +2133,7 @@
             </a:ln>
             <a:extLst>
               <a:ext uri="{91240B29-F687-4f45-9708-019B960494DF}">
-                <a14:hiddenLine xmlns="" xmlns:a14="http://schemas.microsoft.com/office/drawing/2010/main" w="9525">
+                <a14:hiddenLine xmlns:a14="http://schemas.microsoft.com/office/drawing/2010/main" xmlns="" w="9525">
                   <a:solidFill>
                     <a:srgbClr val="000000"/>
                   </a:solidFill>
@@ -2321,7 +2223,7 @@
             </a:ln>
             <a:extLst>
               <a:ext uri="{91240B29-F687-4f45-9708-019B960494DF}">
-                <a14:hiddenLine xmlns="" xmlns:a14="http://schemas.microsoft.com/office/drawing/2010/main" w="9525">
+                <a14:hiddenLine xmlns:a14="http://schemas.microsoft.com/office/drawing/2010/main" xmlns="" w="9525">
                   <a:solidFill>
                     <a:srgbClr val="000000"/>
                   </a:solidFill>
@@ -2377,7 +2279,7 @@
             </a:ln>
             <a:extLst>
               <a:ext uri="{91240B29-F687-4f45-9708-019B960494DF}">
-                <a14:hiddenLine xmlns="" xmlns:a14="http://schemas.microsoft.com/office/drawing/2010/main" w="9525">
+                <a14:hiddenLine xmlns:a14="http://schemas.microsoft.com/office/drawing/2010/main" xmlns="" w="9525">
                   <a:solidFill>
                     <a:srgbClr val="000000"/>
                   </a:solidFill>
@@ -2467,7 +2369,7 @@
             </a:ln>
             <a:extLst>
               <a:ext uri="{91240B29-F687-4f45-9708-019B960494DF}">
-                <a14:hiddenLine xmlns="" xmlns:a14="http://schemas.microsoft.com/office/drawing/2010/main" w="9525">
+                <a14:hiddenLine xmlns:a14="http://schemas.microsoft.com/office/drawing/2010/main" xmlns="" w="9525">
                   <a:solidFill>
                     <a:srgbClr val="000000"/>
                   </a:solidFill>
@@ -2523,7 +2425,7 @@
             </a:ln>
             <a:extLst>
               <a:ext uri="{91240B29-F687-4f45-9708-019B960494DF}">
-                <a14:hiddenLine xmlns="" xmlns:a14="http://schemas.microsoft.com/office/drawing/2010/main" w="9525">
+                <a14:hiddenLine xmlns:a14="http://schemas.microsoft.com/office/drawing/2010/main" xmlns="" w="9525">
                   <a:solidFill>
                     <a:srgbClr val="000000"/>
                   </a:solidFill>
@@ -2613,7 +2515,7 @@
             </a:ln>
             <a:extLst>
               <a:ext uri="{91240B29-F687-4f45-9708-019B960494DF}">
-                <a14:hiddenLine xmlns="" xmlns:a14="http://schemas.microsoft.com/office/drawing/2010/main" w="9525">
+                <a14:hiddenLine xmlns:a14="http://schemas.microsoft.com/office/drawing/2010/main" xmlns="" w="9525">
                   <a:solidFill>
                     <a:srgbClr val="000000"/>
                   </a:solidFill>
@@ -2681,7 +2583,7 @@
             </a:ln>
             <a:extLst>
               <a:ext uri="{91240B29-F687-4f45-9708-019B960494DF}">
-                <a14:hiddenLine xmlns="" xmlns:a14="http://schemas.microsoft.com/office/drawing/2010/main" w="9525">
+                <a14:hiddenLine xmlns:a14="http://schemas.microsoft.com/office/drawing/2010/main" xmlns="" w="9525">
                   <a:solidFill>
                     <a:srgbClr val="000000"/>
                   </a:solidFill>
@@ -2771,7 +2673,7 @@
             </a:ln>
             <a:extLst>
               <a:ext uri="{91240B29-F687-4f45-9708-019B960494DF}">
-                <a14:hiddenLine xmlns="" xmlns:a14="http://schemas.microsoft.com/office/drawing/2010/main" w="9525">
+                <a14:hiddenLine xmlns:a14="http://schemas.microsoft.com/office/drawing/2010/main" xmlns="" w="9525">
                   <a:solidFill>
                     <a:srgbClr val="000000"/>
                   </a:solidFill>
@@ -2839,7 +2741,7 @@
             </a:ln>
             <a:extLst>
               <a:ext uri="{91240B29-F687-4f45-9708-019B960494DF}">
-                <a14:hiddenLine xmlns="" xmlns:a14="http://schemas.microsoft.com/office/drawing/2010/main" w="9525">
+                <a14:hiddenLine xmlns:a14="http://schemas.microsoft.com/office/drawing/2010/main" xmlns="" w="9525">
                   <a:solidFill>
                     <a:srgbClr val="000000"/>
                   </a:solidFill>
@@ -2929,7 +2831,7 @@
             </a:ln>
             <a:extLst>
               <a:ext uri="{91240B29-F687-4f45-9708-019B960494DF}">
-                <a14:hiddenLine xmlns="" xmlns:a14="http://schemas.microsoft.com/office/drawing/2010/main" w="9525">
+                <a14:hiddenLine xmlns:a14="http://schemas.microsoft.com/office/drawing/2010/main" xmlns="" w="9525">
                   <a:solidFill>
                     <a:srgbClr val="000000"/>
                   </a:solidFill>
@@ -2963,7 +2865,7 @@
             </a:ln>
             <a:extLst>
               <a:ext uri="{91240B29-F687-4f45-9708-019B960494DF}">
-                <a14:hiddenLine xmlns="" xmlns:a14="http://schemas.microsoft.com/office/drawing/2010/main" w="9525">
+                <a14:hiddenLine xmlns:a14="http://schemas.microsoft.com/office/drawing/2010/main" xmlns="" w="9525">
                   <a:solidFill>
                     <a:srgbClr val="000000"/>
                   </a:solidFill>
@@ -3053,7 +2955,7 @@
             </a:ln>
             <a:extLst>
               <a:ext uri="{91240B29-F687-4f45-9708-019B960494DF}">
-                <a14:hiddenLine xmlns="" xmlns:a14="http://schemas.microsoft.com/office/drawing/2010/main" w="9525">
+                <a14:hiddenLine xmlns:a14="http://schemas.microsoft.com/office/drawing/2010/main" xmlns="" w="9525">
                   <a:solidFill>
                     <a:srgbClr val="000000"/>
                   </a:solidFill>
@@ -3115,7 +3017,7 @@
             </a:ln>
             <a:extLst>
               <a:ext uri="{91240B29-F687-4f45-9708-019B960494DF}">
-                <a14:hiddenLine xmlns="" xmlns:a14="http://schemas.microsoft.com/office/drawing/2010/main" w="9525">
+                <a14:hiddenLine xmlns:a14="http://schemas.microsoft.com/office/drawing/2010/main" xmlns="" w="9525">
                   <a:solidFill>
                     <a:srgbClr val="000000"/>
                   </a:solidFill>
@@ -3177,7 +3079,7 @@
             </a:ln>
             <a:extLst>
               <a:ext uri="{91240B29-F687-4f45-9708-019B960494DF}">
-                <a14:hiddenLine xmlns="" xmlns:a14="http://schemas.microsoft.com/office/drawing/2010/main" w="9525">
+                <a14:hiddenLine xmlns:a14="http://schemas.microsoft.com/office/drawing/2010/main" xmlns="" w="9525">
                   <a:solidFill>
                     <a:srgbClr val="000000"/>
                   </a:solidFill>
@@ -3267,7 +3169,7 @@
             </a:ln>
             <a:extLst>
               <a:ext uri="{91240B29-F687-4f45-9708-019B960494DF}">
-                <a14:hiddenLine xmlns="" xmlns:a14="http://schemas.microsoft.com/office/drawing/2010/main" w="9525">
+                <a14:hiddenLine xmlns:a14="http://schemas.microsoft.com/office/drawing/2010/main" xmlns="" w="9525">
                   <a:solidFill>
                     <a:srgbClr val="000000"/>
                   </a:solidFill>
@@ -3335,7 +3237,7 @@
             </a:ln>
             <a:extLst>
               <a:ext uri="{91240B29-F687-4f45-9708-019B960494DF}">
-                <a14:hiddenLine xmlns="" xmlns:a14="http://schemas.microsoft.com/office/drawing/2010/main" w="9525">
+                <a14:hiddenLine xmlns:a14="http://schemas.microsoft.com/office/drawing/2010/main" xmlns="" w="9525">
                   <a:solidFill>
                     <a:srgbClr val="000000"/>
                   </a:solidFill>
@@ -3397,7 +3299,7 @@
             </a:ln>
             <a:extLst>
               <a:ext uri="{91240B29-F687-4f45-9708-019B960494DF}">
-                <a14:hiddenLine xmlns="" xmlns:a14="http://schemas.microsoft.com/office/drawing/2010/main" w="9525">
+                <a14:hiddenLine xmlns:a14="http://schemas.microsoft.com/office/drawing/2010/main" xmlns="" w="9525">
                   <a:solidFill>
                     <a:srgbClr val="000000"/>
                   </a:solidFill>
@@ -3487,7 +3389,7 @@
             </a:ln>
             <a:extLst>
               <a:ext uri="{91240B29-F687-4f45-9708-019B960494DF}">
-                <a14:hiddenLine xmlns="" xmlns:a14="http://schemas.microsoft.com/office/drawing/2010/main" w="9525">
+                <a14:hiddenLine xmlns:a14="http://schemas.microsoft.com/office/drawing/2010/main" xmlns="" w="9525">
                   <a:solidFill>
                     <a:srgbClr val="000000"/>
                   </a:solidFill>
@@ -3549,7 +3451,7 @@
             </a:ln>
             <a:extLst>
               <a:ext uri="{91240B29-F687-4f45-9708-019B960494DF}">
-                <a14:hiddenLine xmlns="" xmlns:a14="http://schemas.microsoft.com/office/drawing/2010/main" w="9525">
+                <a14:hiddenLine xmlns:a14="http://schemas.microsoft.com/office/drawing/2010/main" xmlns="" w="9525">
                   <a:solidFill>
                     <a:srgbClr val="000000"/>
                   </a:solidFill>
@@ -3639,7 +3541,7 @@
             </a:ln>
             <a:extLst>
               <a:ext uri="{91240B29-F687-4f45-9708-019B960494DF}">
-                <a14:hiddenLine xmlns="" xmlns:a14="http://schemas.microsoft.com/office/drawing/2010/main" w="9525">
+                <a14:hiddenLine xmlns:a14="http://schemas.microsoft.com/office/drawing/2010/main" xmlns="" w="9525">
                   <a:solidFill>
                     <a:srgbClr val="000000"/>
                   </a:solidFill>
@@ -3701,7 +3603,7 @@
             </a:ln>
             <a:extLst>
               <a:ext uri="{91240B29-F687-4f45-9708-019B960494DF}">
-                <a14:hiddenLine xmlns="" xmlns:a14="http://schemas.microsoft.com/office/drawing/2010/main" w="9525">
+                <a14:hiddenLine xmlns:a14="http://schemas.microsoft.com/office/drawing/2010/main" xmlns="" w="9525">
                   <a:solidFill>
                     <a:srgbClr val="000000"/>
                   </a:solidFill>
@@ -3791,7 +3693,7 @@
             </a:ln>
             <a:extLst>
               <a:ext uri="{91240B29-F687-4f45-9708-019B960494DF}">
-                <a14:hiddenLine xmlns="" xmlns:a14="http://schemas.microsoft.com/office/drawing/2010/main" w="9525">
+                <a14:hiddenLine xmlns:a14="http://schemas.microsoft.com/office/drawing/2010/main" xmlns="" w="9525">
                   <a:solidFill>
                     <a:srgbClr val="000000"/>
                   </a:solidFill>
@@ -3825,7 +3727,7 @@
             </a:ln>
             <a:extLst>
               <a:ext uri="{91240B29-F687-4f45-9708-019B960494DF}">
-                <a14:hiddenLine xmlns="" xmlns:a14="http://schemas.microsoft.com/office/drawing/2010/main" w="9525">
+                <a14:hiddenLine xmlns:a14="http://schemas.microsoft.com/office/drawing/2010/main" xmlns="" w="9525">
                   <a:solidFill>
                     <a:srgbClr val="000000"/>
                   </a:solidFill>
@@ -3890,7 +3792,7 @@
             </a:ln>
             <a:extLst>
               <a:ext uri="{91240B29-F687-4f45-9708-019B960494DF}">
-                <a14:hiddenLine xmlns="" xmlns:a14="http://schemas.microsoft.com/office/drawing/2010/main" w="9525">
+                <a14:hiddenLine xmlns:a14="http://schemas.microsoft.com/office/drawing/2010/main" xmlns="" w="9525">
                   <a:solidFill>
                     <a:srgbClr val="000000"/>
                   </a:solidFill>
@@ -3980,7 +3882,7 @@
             </a:ln>
             <a:extLst>
               <a:ext uri="{91240B29-F687-4f45-9708-019B960494DF}">
-                <a14:hiddenLine xmlns="" xmlns:a14="http://schemas.microsoft.com/office/drawing/2010/main" w="9525">
+                <a14:hiddenLine xmlns:a14="http://schemas.microsoft.com/office/drawing/2010/main" xmlns="" w="9525">
                   <a:solidFill>
                     <a:srgbClr val="000000"/>
                   </a:solidFill>
@@ -4042,7 +3944,7 @@
             </a:ln>
             <a:extLst>
               <a:ext uri="{91240B29-F687-4f45-9708-019B960494DF}">
-                <a14:hiddenLine xmlns="" xmlns:a14="http://schemas.microsoft.com/office/drawing/2010/main" w="9525">
+                <a14:hiddenLine xmlns:a14="http://schemas.microsoft.com/office/drawing/2010/main" xmlns="" w="9525">
                   <a:solidFill>
                     <a:srgbClr val="000000"/>
                   </a:solidFill>
@@ -4132,7 +4034,7 @@
             </a:ln>
             <a:extLst>
               <a:ext uri="{91240B29-F687-4f45-9708-019B960494DF}">
-                <a14:hiddenLine xmlns="" xmlns:a14="http://schemas.microsoft.com/office/drawing/2010/main" w="9525">
+                <a14:hiddenLine xmlns:a14="http://schemas.microsoft.com/office/drawing/2010/main" xmlns="" w="9525">
                   <a:solidFill>
                     <a:srgbClr val="000000"/>
                   </a:solidFill>
@@ -4222,7 +4124,7 @@
             </a:ln>
             <a:extLst>
               <a:ext uri="{91240B29-F687-4f45-9708-019B960494DF}">
-                <a14:hiddenLine xmlns="" xmlns:a14="http://schemas.microsoft.com/office/drawing/2010/main" w="9525">
+                <a14:hiddenLine xmlns:a14="http://schemas.microsoft.com/office/drawing/2010/main" xmlns="" w="9525">
                   <a:solidFill>
                     <a:srgbClr val="000000"/>
                   </a:solidFill>
@@ -4287,7 +4189,7 @@
             </a:ln>
             <a:extLst>
               <a:ext uri="{91240B29-F687-4f45-9708-019B960494DF}">
-                <a14:hiddenLine xmlns="" xmlns:a14="http://schemas.microsoft.com/office/drawing/2010/main" w="9525">
+                <a14:hiddenLine xmlns:a14="http://schemas.microsoft.com/office/drawing/2010/main" xmlns="" w="9525">
                   <a:solidFill>
                     <a:srgbClr val="000000"/>
                   </a:solidFill>
@@ -4349,7 +4251,7 @@
             </a:ln>
             <a:extLst>
               <a:ext uri="{91240B29-F687-4f45-9708-019B960494DF}">
-                <a14:hiddenLine xmlns="" xmlns:a14="http://schemas.microsoft.com/office/drawing/2010/main" w="9525">
+                <a14:hiddenLine xmlns:a14="http://schemas.microsoft.com/office/drawing/2010/main" xmlns="" w="9525">
                   <a:solidFill>
                     <a:srgbClr val="000000"/>
                   </a:solidFill>
@@ -4439,7 +4341,7 @@
             </a:ln>
             <a:extLst>
               <a:ext uri="{91240B29-F687-4f45-9708-019B960494DF}">
-                <a14:hiddenLine xmlns="" xmlns:a14="http://schemas.microsoft.com/office/drawing/2010/main" w="9525">
+                <a14:hiddenLine xmlns:a14="http://schemas.microsoft.com/office/drawing/2010/main" xmlns="" w="9525">
                   <a:solidFill>
                     <a:srgbClr val="000000"/>
                   </a:solidFill>
@@ -4529,7 +4431,7 @@
             </a:ln>
             <a:extLst>
               <a:ext uri="{91240B29-F687-4f45-9708-019B960494DF}">
-                <a14:hiddenLine xmlns="" xmlns:a14="http://schemas.microsoft.com/office/drawing/2010/main" w="9525">
+                <a14:hiddenLine xmlns:a14="http://schemas.microsoft.com/office/drawing/2010/main" xmlns="" w="9525">
                   <a:solidFill>
                     <a:srgbClr val="000000"/>
                   </a:solidFill>
@@ -4591,7 +4493,7 @@
             </a:ln>
             <a:extLst>
               <a:ext uri="{91240B29-F687-4f45-9708-019B960494DF}">
-                <a14:hiddenLine xmlns="" xmlns:a14="http://schemas.microsoft.com/office/drawing/2010/main" w="9525">
+                <a14:hiddenLine xmlns:a14="http://schemas.microsoft.com/office/drawing/2010/main" xmlns="" w="9525">
                   <a:solidFill>
                     <a:srgbClr val="000000"/>
                   </a:solidFill>
@@ -4711,7 +4613,7 @@
             </a:ln>
             <a:extLst>
               <a:ext uri="{91240B29-F687-4f45-9708-019B960494DF}">
-                <a14:hiddenLine xmlns="" xmlns:a14="http://schemas.microsoft.com/office/drawing/2010/main" w="9525">
+                <a14:hiddenLine xmlns:a14="http://schemas.microsoft.com/office/drawing/2010/main" xmlns="" w="9525">
                   <a:solidFill>
                     <a:srgbClr val="000000"/>
                   </a:solidFill>
@@ -4779,7 +4681,7 @@
             </a:ln>
             <a:extLst>
               <a:ext uri="{91240B29-F687-4f45-9708-019B960494DF}">
-                <a14:hiddenLine xmlns="" xmlns:a14="http://schemas.microsoft.com/office/drawing/2010/main" w="9525">
+                <a14:hiddenLine xmlns:a14="http://schemas.microsoft.com/office/drawing/2010/main" xmlns="" w="9525">
                   <a:solidFill>
                     <a:srgbClr val="000000"/>
                   </a:solidFill>
@@ -4869,7 +4771,7 @@
             </a:ln>
             <a:extLst>
               <a:ext uri="{91240B29-F687-4f45-9708-019B960494DF}">
-                <a14:hiddenLine xmlns="" xmlns:a14="http://schemas.microsoft.com/office/drawing/2010/main" w="9525">
+                <a14:hiddenLine xmlns:a14="http://schemas.microsoft.com/office/drawing/2010/main" xmlns="" w="9525">
                   <a:solidFill>
                     <a:srgbClr val="000000"/>
                   </a:solidFill>
@@ -9598,7 +9500,7 @@
           <a:noFill/>
           <a:extLst>
             <a:ext uri="{909E8E84-426E-40dd-AFC4-6F175D3DCCD1}">
-              <a14:hiddenFill xmlns="" xmlns:a14="http://schemas.microsoft.com/office/drawing/2010/main">
+              <a14:hiddenFill xmlns:a14="http://schemas.microsoft.com/office/drawing/2010/main" xmlns="">
                 <a:solidFill>
                   <a:srgbClr val="FFFFFF"/>
                 </a:solidFill>
@@ -9672,7 +9574,7 @@
               </a:ln>
               <a:extLst>
                 <a:ext uri="{91240B29-F687-4f45-9708-019B960494DF}">
-                  <a14:hiddenLine xmlns="" xmlns:a14="http://schemas.microsoft.com/office/drawing/2010/main" w="9525">
+                  <a14:hiddenLine xmlns:a14="http://schemas.microsoft.com/office/drawing/2010/main" xmlns="" w="9525">
                     <a:solidFill>
                       <a:srgbClr val="000000"/>
                     </a:solidFill>
@@ -9762,7 +9664,7 @@
               </a:ln>
               <a:extLst>
                 <a:ext uri="{91240B29-F687-4f45-9708-019B960494DF}">
-                  <a14:hiddenLine xmlns="" xmlns:a14="http://schemas.microsoft.com/office/drawing/2010/main" w="9525">
+                  <a14:hiddenLine xmlns:a14="http://schemas.microsoft.com/office/drawing/2010/main" xmlns="" w="9525">
                     <a:solidFill>
                       <a:srgbClr val="000000"/>
                     </a:solidFill>
@@ -9852,7 +9754,7 @@
               </a:ln>
               <a:extLst>
                 <a:ext uri="{91240B29-F687-4f45-9708-019B960494DF}">
-                  <a14:hiddenLine xmlns="" xmlns:a14="http://schemas.microsoft.com/office/drawing/2010/main" w="9525">
+                  <a14:hiddenLine xmlns:a14="http://schemas.microsoft.com/office/drawing/2010/main" xmlns="" w="9525">
                     <a:solidFill>
                       <a:srgbClr val="000000"/>
                     </a:solidFill>
@@ -9914,7 +9816,7 @@
               </a:ln>
               <a:extLst>
                 <a:ext uri="{91240B29-F687-4f45-9708-019B960494DF}">
-                  <a14:hiddenLine xmlns="" xmlns:a14="http://schemas.microsoft.com/office/drawing/2010/main" w="9525">
+                  <a14:hiddenLine xmlns:a14="http://schemas.microsoft.com/office/drawing/2010/main" xmlns="" w="9525">
                     <a:solidFill>
                       <a:srgbClr val="000000"/>
                     </a:solidFill>
@@ -10004,7 +9906,7 @@
               </a:ln>
               <a:extLst>
                 <a:ext uri="{91240B29-F687-4f45-9708-019B960494DF}">
-                  <a14:hiddenLine xmlns="" xmlns:a14="http://schemas.microsoft.com/office/drawing/2010/main" w="9525">
+                  <a14:hiddenLine xmlns:a14="http://schemas.microsoft.com/office/drawing/2010/main" xmlns="" w="9525">
                     <a:solidFill>
                       <a:srgbClr val="000000"/>
                     </a:solidFill>
@@ -10066,7 +9968,7 @@
               </a:ln>
               <a:extLst>
                 <a:ext uri="{91240B29-F687-4f45-9708-019B960494DF}">
-                  <a14:hiddenLine xmlns="" xmlns:a14="http://schemas.microsoft.com/office/drawing/2010/main" w="9525">
+                  <a14:hiddenLine xmlns:a14="http://schemas.microsoft.com/office/drawing/2010/main" xmlns="" w="9525">
                     <a:solidFill>
                       <a:srgbClr val="000000"/>
                     </a:solidFill>
@@ -10128,7 +10030,7 @@
               </a:ln>
               <a:extLst>
                 <a:ext uri="{91240B29-F687-4f45-9708-019B960494DF}">
-                  <a14:hiddenLine xmlns="" xmlns:a14="http://schemas.microsoft.com/office/drawing/2010/main" w="9525">
+                  <a14:hiddenLine xmlns:a14="http://schemas.microsoft.com/office/drawing/2010/main" xmlns="" w="9525">
                     <a:solidFill>
                       <a:srgbClr val="000000"/>
                     </a:solidFill>
@@ -10218,7 +10120,7 @@
               </a:ln>
               <a:extLst>
                 <a:ext uri="{91240B29-F687-4f45-9708-019B960494DF}">
-                  <a14:hiddenLine xmlns="" xmlns:a14="http://schemas.microsoft.com/office/drawing/2010/main" w="9525">
+                  <a14:hiddenLine xmlns:a14="http://schemas.microsoft.com/office/drawing/2010/main" xmlns="" w="9525">
                     <a:solidFill>
                       <a:srgbClr val="000000"/>
                     </a:solidFill>
@@ -10308,7 +10210,7 @@
               </a:ln>
               <a:extLst>
                 <a:ext uri="{91240B29-F687-4f45-9708-019B960494DF}">
-                  <a14:hiddenLine xmlns="" xmlns:a14="http://schemas.microsoft.com/office/drawing/2010/main" w="9525">
+                  <a14:hiddenLine xmlns:a14="http://schemas.microsoft.com/office/drawing/2010/main" xmlns="" w="9525">
                     <a:solidFill>
                       <a:srgbClr val="000000"/>
                     </a:solidFill>
@@ -10370,7 +10272,7 @@
               </a:ln>
               <a:extLst>
                 <a:ext uri="{91240B29-F687-4f45-9708-019B960494DF}">
-                  <a14:hiddenLine xmlns="" xmlns:a14="http://schemas.microsoft.com/office/drawing/2010/main" w="9525">
+                  <a14:hiddenLine xmlns:a14="http://schemas.microsoft.com/office/drawing/2010/main" xmlns="" w="9525">
                     <a:solidFill>
                       <a:srgbClr val="000000"/>
                     </a:solidFill>
@@ -10480,7 +10382,7 @@
               </a:ln>
               <a:extLst>
                 <a:ext uri="{91240B29-F687-4f45-9708-019B960494DF}">
-                  <a14:hiddenLine xmlns="" xmlns:a14="http://schemas.microsoft.com/office/drawing/2010/main" w="9525">
+                  <a14:hiddenLine xmlns:a14="http://schemas.microsoft.com/office/drawing/2010/main" xmlns="" w="9525">
                     <a:solidFill>
                       <a:srgbClr val="000000"/>
                     </a:solidFill>
@@ -10564,7 +10466,7 @@
               </a:ln>
               <a:extLst>
                 <a:ext uri="{91240B29-F687-4f45-9708-019B960494DF}">
-                  <a14:hiddenLine xmlns="" xmlns:a14="http://schemas.microsoft.com/office/drawing/2010/main" w="9525">
+                  <a14:hiddenLine xmlns:a14="http://schemas.microsoft.com/office/drawing/2010/main" xmlns="" w="9525">
                     <a:solidFill>
                       <a:srgbClr val="000000"/>
                     </a:solidFill>
@@ -10626,7 +10528,7 @@
               </a:ln>
               <a:extLst>
                 <a:ext uri="{91240B29-F687-4f45-9708-019B960494DF}">
-                  <a14:hiddenLine xmlns="" xmlns:a14="http://schemas.microsoft.com/office/drawing/2010/main" w="9525">
+                  <a14:hiddenLine xmlns:a14="http://schemas.microsoft.com/office/drawing/2010/main" xmlns="" w="9525">
                     <a:solidFill>
                       <a:srgbClr val="000000"/>
                     </a:solidFill>
@@ -10688,7 +10590,7 @@
               </a:ln>
               <a:extLst>
                 <a:ext uri="{91240B29-F687-4f45-9708-019B960494DF}">
-                  <a14:hiddenLine xmlns="" xmlns:a14="http://schemas.microsoft.com/office/drawing/2010/main" w="9525">
+                  <a14:hiddenLine xmlns:a14="http://schemas.microsoft.com/office/drawing/2010/main" xmlns="" w="9525">
                     <a:solidFill>
                       <a:srgbClr val="000000"/>
                     </a:solidFill>
@@ -10778,7 +10680,7 @@
               </a:ln>
               <a:extLst>
                 <a:ext uri="{91240B29-F687-4f45-9708-019B960494DF}">
-                  <a14:hiddenLine xmlns="" xmlns:a14="http://schemas.microsoft.com/office/drawing/2010/main" w="9525">
+                  <a14:hiddenLine xmlns:a14="http://schemas.microsoft.com/office/drawing/2010/main" xmlns="" w="9525">
                     <a:solidFill>
                       <a:srgbClr val="000000"/>
                     </a:solidFill>
@@ -10812,7 +10714,7 @@
               </a:ln>
               <a:extLst>
                 <a:ext uri="{91240B29-F687-4f45-9708-019B960494DF}">
-                  <a14:hiddenLine xmlns="" xmlns:a14="http://schemas.microsoft.com/office/drawing/2010/main" w="9525">
+                  <a14:hiddenLine xmlns:a14="http://schemas.microsoft.com/office/drawing/2010/main" xmlns="" w="9525">
                     <a:solidFill>
                       <a:srgbClr val="000000"/>
                     </a:solidFill>
@@ -10877,7 +10779,7 @@
               </a:ln>
               <a:extLst>
                 <a:ext uri="{91240B29-F687-4f45-9708-019B960494DF}">
-                  <a14:hiddenLine xmlns="" xmlns:a14="http://schemas.microsoft.com/office/drawing/2010/main" w="9525">
+                  <a14:hiddenLine xmlns:a14="http://schemas.microsoft.com/office/drawing/2010/main" xmlns="" w="9525">
                     <a:solidFill>
                       <a:srgbClr val="000000"/>
                     </a:solidFill>
@@ -10967,7 +10869,7 @@
               </a:ln>
               <a:extLst>
                 <a:ext uri="{91240B29-F687-4f45-9708-019B960494DF}">
-                  <a14:hiddenLine xmlns="" xmlns:a14="http://schemas.microsoft.com/office/drawing/2010/main" w="9525">
+                  <a14:hiddenLine xmlns:a14="http://schemas.microsoft.com/office/drawing/2010/main" xmlns="" w="9525">
                     <a:solidFill>
                       <a:srgbClr val="000000"/>
                     </a:solidFill>
@@ -11029,7 +10931,7 @@
               </a:ln>
               <a:extLst>
                 <a:ext uri="{91240B29-F687-4f45-9708-019B960494DF}">
-                  <a14:hiddenLine xmlns="" xmlns:a14="http://schemas.microsoft.com/office/drawing/2010/main" w="9525">
+                  <a14:hiddenLine xmlns:a14="http://schemas.microsoft.com/office/drawing/2010/main" xmlns="" w="9525">
                     <a:solidFill>
                       <a:srgbClr val="000000"/>
                     </a:solidFill>
@@ -11119,7 +11021,7 @@
               </a:ln>
               <a:extLst>
                 <a:ext uri="{91240B29-F687-4f45-9708-019B960494DF}">
-                  <a14:hiddenLine xmlns="" xmlns:a14="http://schemas.microsoft.com/office/drawing/2010/main" w="9525">
+                  <a14:hiddenLine xmlns:a14="http://schemas.microsoft.com/office/drawing/2010/main" xmlns="" w="9525">
                     <a:solidFill>
                       <a:srgbClr val="000000"/>
                     </a:solidFill>
@@ -11184,7 +11086,7 @@
               </a:ln>
               <a:extLst>
                 <a:ext uri="{91240B29-F687-4f45-9708-019B960494DF}">
-                  <a14:hiddenLine xmlns="" xmlns:a14="http://schemas.microsoft.com/office/drawing/2010/main" w="9525">
+                  <a14:hiddenLine xmlns:a14="http://schemas.microsoft.com/office/drawing/2010/main" xmlns="" w="9525">
                     <a:solidFill>
                       <a:srgbClr val="000000"/>
                     </a:solidFill>
@@ -11246,7 +11148,7 @@
               </a:ln>
               <a:extLst>
                 <a:ext uri="{91240B29-F687-4f45-9708-019B960494DF}">
-                  <a14:hiddenLine xmlns="" xmlns:a14="http://schemas.microsoft.com/office/drawing/2010/main" w="9525">
+                  <a14:hiddenLine xmlns:a14="http://schemas.microsoft.com/office/drawing/2010/main" xmlns="" w="9525">
                     <a:solidFill>
                       <a:srgbClr val="000000"/>
                     </a:solidFill>
@@ -11336,7 +11238,7 @@
               </a:ln>
               <a:extLst>
                 <a:ext uri="{91240B29-F687-4f45-9708-019B960494DF}">
-                  <a14:hiddenLine xmlns="" xmlns:a14="http://schemas.microsoft.com/office/drawing/2010/main" w="9525">
+                  <a14:hiddenLine xmlns:a14="http://schemas.microsoft.com/office/drawing/2010/main" xmlns="" w="9525">
                     <a:solidFill>
                       <a:srgbClr val="000000"/>
                     </a:solidFill>
@@ -11426,7 +11328,7 @@
               </a:ln>
               <a:extLst>
                 <a:ext uri="{91240B29-F687-4f45-9708-019B960494DF}">
-                  <a14:hiddenLine xmlns="" xmlns:a14="http://schemas.microsoft.com/office/drawing/2010/main" w="9525">
+                  <a14:hiddenLine xmlns:a14="http://schemas.microsoft.com/office/drawing/2010/main" xmlns="" w="9525">
                     <a:solidFill>
                       <a:srgbClr val="000000"/>
                     </a:solidFill>
@@ -11491,7 +11393,7 @@
               </a:ln>
               <a:extLst>
                 <a:ext uri="{91240B29-F687-4f45-9708-019B960494DF}">
-                  <a14:hiddenLine xmlns="" xmlns:a14="http://schemas.microsoft.com/office/drawing/2010/main" w="9525">
+                  <a14:hiddenLine xmlns:a14="http://schemas.microsoft.com/office/drawing/2010/main" xmlns="" w="9525">
                     <a:solidFill>
                       <a:srgbClr val="000000"/>
                     </a:solidFill>
@@ -11611,7 +11513,7 @@
               </a:ln>
               <a:extLst>
                 <a:ext uri="{91240B29-F687-4f45-9708-019B960494DF}">
-                  <a14:hiddenLine xmlns="" xmlns:a14="http://schemas.microsoft.com/office/drawing/2010/main" w="9525">
+                  <a14:hiddenLine xmlns:a14="http://schemas.microsoft.com/office/drawing/2010/main" xmlns="" w="9525">
                     <a:solidFill>
                       <a:srgbClr val="000000"/>
                     </a:solidFill>
@@ -11692,7 +11594,7 @@
               </a:ln>
               <a:extLst>
                 <a:ext uri="{91240B29-F687-4f45-9708-019B960494DF}">
-                  <a14:hiddenLine xmlns="" xmlns:a14="http://schemas.microsoft.com/office/drawing/2010/main" w="9525">
+                  <a14:hiddenLine xmlns:a14="http://schemas.microsoft.com/office/drawing/2010/main" xmlns="" w="9525">
                     <a:solidFill>
                       <a:srgbClr val="000000"/>
                     </a:solidFill>
@@ -11807,7 +11709,7 @@
               </a:ln>
               <a:extLst>
                 <a:ext uri="{91240B29-F687-4f45-9708-019B960494DF}">
-                  <a14:hiddenLine xmlns="" xmlns:a14="http://schemas.microsoft.com/office/drawing/2010/main" w="9525">
+                  <a14:hiddenLine xmlns:a14="http://schemas.microsoft.com/office/drawing/2010/main" xmlns="" w="9525">
                     <a:solidFill>
                       <a:srgbClr val="000000"/>
                     </a:solidFill>
@@ -11897,7 +11799,7 @@
               </a:ln>
               <a:extLst>
                 <a:ext uri="{91240B29-F687-4f45-9708-019B960494DF}">
-                  <a14:hiddenLine xmlns="" xmlns:a14="http://schemas.microsoft.com/office/drawing/2010/main" w="9525">
+                  <a14:hiddenLine xmlns:a14="http://schemas.microsoft.com/office/drawing/2010/main" xmlns="" w="9525">
                     <a:solidFill>
                       <a:srgbClr val="000000"/>
                     </a:solidFill>
@@ -11962,7 +11864,7 @@
               </a:ln>
               <a:extLst>
                 <a:ext uri="{91240B29-F687-4f45-9708-019B960494DF}">
-                  <a14:hiddenLine xmlns="" xmlns:a14="http://schemas.microsoft.com/office/drawing/2010/main" w="9525">
+                  <a14:hiddenLine xmlns:a14="http://schemas.microsoft.com/office/drawing/2010/main" xmlns="" w="9525">
                     <a:solidFill>
                       <a:srgbClr val="000000"/>
                     </a:solidFill>
@@ -12052,7 +11954,7 @@
               </a:ln>
               <a:extLst>
                 <a:ext uri="{91240B29-F687-4f45-9708-019B960494DF}">
-                  <a14:hiddenLine xmlns="" xmlns:a14="http://schemas.microsoft.com/office/drawing/2010/main" w="9525">
+                  <a14:hiddenLine xmlns:a14="http://schemas.microsoft.com/office/drawing/2010/main" xmlns="" w="9525">
                     <a:solidFill>
                       <a:srgbClr val="000000"/>
                     </a:solidFill>
@@ -12120,7 +12022,7 @@
               </a:ln>
               <a:extLst>
                 <a:ext uri="{91240B29-F687-4f45-9708-019B960494DF}">
-                  <a14:hiddenLine xmlns="" xmlns:a14="http://schemas.microsoft.com/office/drawing/2010/main" w="9525">
+                  <a14:hiddenLine xmlns:a14="http://schemas.microsoft.com/office/drawing/2010/main" xmlns="" w="9525">
                     <a:solidFill>
                       <a:srgbClr val="000000"/>
                     </a:solidFill>
@@ -12210,7 +12112,7 @@
               </a:ln>
               <a:extLst>
                 <a:ext uri="{91240B29-F687-4f45-9708-019B960494DF}">
-                  <a14:hiddenLine xmlns="" xmlns:a14="http://schemas.microsoft.com/office/drawing/2010/main" w="9525">
+                  <a14:hiddenLine xmlns:a14="http://schemas.microsoft.com/office/drawing/2010/main" xmlns="" w="9525">
                     <a:solidFill>
                       <a:srgbClr val="000000"/>
                     </a:solidFill>
@@ -12278,7 +12180,7 @@
               </a:ln>
               <a:extLst>
                 <a:ext uri="{91240B29-F687-4f45-9708-019B960494DF}">
-                  <a14:hiddenLine xmlns="" xmlns:a14="http://schemas.microsoft.com/office/drawing/2010/main" w="9525">
+                  <a14:hiddenLine xmlns:a14="http://schemas.microsoft.com/office/drawing/2010/main" xmlns="" w="9525">
                     <a:solidFill>
                       <a:srgbClr val="000000"/>
                     </a:solidFill>
@@ -12368,7 +12270,7 @@
               </a:ln>
               <a:extLst>
                 <a:ext uri="{91240B29-F687-4f45-9708-019B960494DF}">
-                  <a14:hiddenLine xmlns="" xmlns:a14="http://schemas.microsoft.com/office/drawing/2010/main" w="9525">
+                  <a14:hiddenLine xmlns:a14="http://schemas.microsoft.com/office/drawing/2010/main" xmlns="" w="9525">
                     <a:solidFill>
                       <a:srgbClr val="000000"/>
                     </a:solidFill>
@@ -12402,7 +12304,7 @@
               </a:ln>
               <a:extLst>
                 <a:ext uri="{91240B29-F687-4f45-9708-019B960494DF}">
-                  <a14:hiddenLine xmlns="" xmlns:a14="http://schemas.microsoft.com/office/drawing/2010/main" w="9525">
+                  <a14:hiddenLine xmlns:a14="http://schemas.microsoft.com/office/drawing/2010/main" xmlns="" w="9525">
                     <a:solidFill>
                       <a:srgbClr val="000000"/>
                     </a:solidFill>
@@ -13022,72 +12924,6 @@
 </p:sld>
 </file>
 
-<file path=ppt/slides/slide10.xml><?xml version="1.0" encoding="utf-8"?>
-<p:sld xmlns:a="http://schemas.openxmlformats.org/drawingml/2006/main" xmlns:r="http://schemas.openxmlformats.org/officeDocument/2006/relationships" xmlns:p="http://schemas.openxmlformats.org/presentationml/2006/main">
-  <p:cSld>
-    <p:spTree>
-      <p:nvGrpSpPr>
-        <p:cNvPr id="1" name=""/>
-        <p:cNvGrpSpPr/>
-        <p:nvPr/>
-      </p:nvGrpSpPr>
-      <p:grpSpPr>
-        <a:xfrm>
-          <a:off x="0" y="0"/>
-          <a:ext cx="0" cy="0"/>
-          <a:chOff x="0" y="0"/>
-          <a:chExt cx="0" cy="0"/>
-        </a:xfrm>
-      </p:grpSpPr>
-      <p:sp>
-        <p:nvSpPr>
-          <p:cNvPr id="2" name="Titel 1">
-            <a:extLst>
-              <a:ext uri="{FF2B5EF4-FFF2-40B4-BE49-F238E27FC236}">
-                <a16:creationId xmlns:a16="http://schemas.microsoft.com/office/drawing/2014/main" id="{E870BB39-3894-404C-9070-6172E1BBFABA}"/>
-              </a:ext>
-            </a:extLst>
-          </p:cNvPr>
-          <p:cNvSpPr>
-            <a:spLocks noGrp="1"/>
-          </p:cNvSpPr>
-          <p:nvPr>
-            <p:ph type="title"/>
-          </p:nvPr>
-        </p:nvSpPr>
-        <p:spPr>
-          <a:xfrm>
-            <a:off x="3361592" y="2689715"/>
-            <a:ext cx="5468815" cy="1478570"/>
-          </a:xfrm>
-        </p:spPr>
-        <p:txBody>
-          <a:bodyPr>
-            <a:normAutofit/>
-          </a:bodyPr>
-          <a:lstStyle/>
-          <a:p>
-            <a:pPr algn="ctr"/>
-            <a:r>
-              <a:rPr lang="da-DK" dirty="0"/>
-              <a:t>Tests og kørende kode</a:t>
-            </a:r>
-          </a:p>
-        </p:txBody>
-      </p:sp>
-    </p:spTree>
-    <p:extLst>
-      <p:ext uri="{BB962C8B-B14F-4D97-AF65-F5344CB8AC3E}">
-        <p14:creationId xmlns:p14="http://schemas.microsoft.com/office/powerpoint/2010/main" val="3054669827"/>
-      </p:ext>
-    </p:extLst>
-  </p:cSld>
-  <p:clrMapOvr>
-    <a:masterClrMapping/>
-  </p:clrMapOvr>
-</p:sld>
-</file>
-
 <file path=ppt/slides/slide2.xml><?xml version="1.0" encoding="utf-8"?>
 <p:sld xmlns:a="http://schemas.openxmlformats.org/drawingml/2006/main" xmlns:r="http://schemas.openxmlformats.org/officeDocument/2006/relationships" xmlns:p="http://schemas.openxmlformats.org/presentationml/2006/main">
   <p:cSld>
@@ -13214,27 +13050,40 @@
             <p:ph type="title"/>
           </p:nvPr>
         </p:nvSpPr>
-        <p:spPr>
-          <a:xfrm>
-            <a:off x="8915400" y="1950430"/>
-            <a:ext cx="2762250" cy="1478570"/>
-          </a:xfrm>
-        </p:spPr>
+        <p:spPr/>
         <p:txBody>
           <a:bodyPr/>
           <a:lstStyle/>
           <a:p>
             <a:r>
               <a:rPr lang="da-DK" dirty="0"/>
-              <a:t>Aktivitets-</a:t>
+              <a:t>aktivitetsdiagram</a:t>
             </a:r>
-            <a:br>
-              <a:rPr lang="da-DK" dirty="0"/>
-            </a:br>
-            <a:r>
-              <a:rPr lang="da-DK" dirty="0"/>
-              <a:t>diagram</a:t>
-            </a:r>
+          </a:p>
+        </p:txBody>
+      </p:sp>
+      <p:sp>
+        <p:nvSpPr>
+          <p:cNvPr id="3" name="Pladsholder til lodret titel 2">
+            <a:extLst>
+              <a:ext uri="{FF2B5EF4-FFF2-40B4-BE49-F238E27FC236}">
+                <a16:creationId xmlns:a16="http://schemas.microsoft.com/office/drawing/2014/main" id="{D557E203-79F8-4145-B653-8FF850EDD5ED}"/>
+              </a:ext>
+            </a:extLst>
+          </p:cNvPr>
+          <p:cNvSpPr>
+            <a:spLocks noGrp="1"/>
+          </p:cNvSpPr>
+          <p:nvPr>
+            <p:ph type="body" orient="vert" idx="1"/>
+          </p:nvPr>
+        </p:nvSpPr>
+        <p:spPr/>
+        <p:txBody>
+          <a:bodyPr/>
+          <a:lstStyle/>
+          <a:p>
+            <a:endParaRPr lang="da-DK" dirty="0"/>
           </a:p>
         </p:txBody>
       </p:sp>
@@ -13260,8 +13109,8 @@
         </p:blipFill>
         <p:spPr>
           <a:xfrm>
-            <a:off x="0" y="0"/>
-            <a:ext cx="8328910" cy="6858000"/>
+            <a:off x="5657671" y="1210052"/>
+            <a:ext cx="5389740" cy="4437896"/>
           </a:xfrm>
           <a:prstGeom prst="rect">
             <a:avLst/>
@@ -13517,7 +13366,7 @@
           <a:noFill/>
           <a:extLst>
             <a:ext uri="{909E8E84-426E-40dd-AFC4-6F175D3DCCD1}">
-              <a14:hiddenFill xmlns:a14="http://schemas.microsoft.com/office/drawing/2010/main" xmlns:p14="http://schemas.microsoft.com/office/powerpoint/2010/main" xmlns="">
+              <a14:hiddenFill xmlns="" xmlns:p14="http://schemas.microsoft.com/office/powerpoint/2010/main" xmlns:a14="http://schemas.microsoft.com/office/drawing/2010/main">
                 <a:solidFill>
                   <a:srgbClr val="FFFFFF"/>
                 </a:solidFill>
@@ -13638,7 +13487,7 @@
               </a:ln>
               <a:extLst>
                 <a:ext uri="{91240B29-F687-4f45-9708-019B960494DF}">
-                  <a14:hiddenLine xmlns:a14="http://schemas.microsoft.com/office/drawing/2010/main" xmlns:p14="http://schemas.microsoft.com/office/powerpoint/2010/main" xmlns="" w="9525">
+                  <a14:hiddenLine xmlns="" xmlns:p14="http://schemas.microsoft.com/office/powerpoint/2010/main" xmlns:a14="http://schemas.microsoft.com/office/drawing/2010/main" w="9525">
                     <a:solidFill>
                       <a:srgbClr val="000000"/>
                     </a:solidFill>
@@ -13743,7 +13592,7 @@
               </a:ln>
               <a:extLst>
                 <a:ext uri="{91240B29-F687-4f45-9708-019B960494DF}">
-                  <a14:hiddenLine xmlns:a14="http://schemas.microsoft.com/office/drawing/2010/main" xmlns:p14="http://schemas.microsoft.com/office/powerpoint/2010/main" xmlns="" w="9525">
+                  <a14:hiddenLine xmlns="" xmlns:p14="http://schemas.microsoft.com/office/powerpoint/2010/main" xmlns:a14="http://schemas.microsoft.com/office/drawing/2010/main" w="9525">
                     <a:solidFill>
                       <a:srgbClr val="000000"/>
                     </a:solidFill>
@@ -13848,7 +13697,7 @@
               </a:ln>
               <a:extLst>
                 <a:ext uri="{91240B29-F687-4f45-9708-019B960494DF}">
-                  <a14:hiddenLine xmlns:a14="http://schemas.microsoft.com/office/drawing/2010/main" xmlns:p14="http://schemas.microsoft.com/office/powerpoint/2010/main" xmlns="" w="9525">
+                  <a14:hiddenLine xmlns="" xmlns:p14="http://schemas.microsoft.com/office/powerpoint/2010/main" xmlns:a14="http://schemas.microsoft.com/office/drawing/2010/main" w="9525">
                     <a:solidFill>
                       <a:srgbClr val="000000"/>
                     </a:solidFill>
@@ -13925,7 +13774,7 @@
               </a:ln>
               <a:extLst>
                 <a:ext uri="{91240B29-F687-4f45-9708-019B960494DF}">
-                  <a14:hiddenLine xmlns:a14="http://schemas.microsoft.com/office/drawing/2010/main" xmlns:p14="http://schemas.microsoft.com/office/powerpoint/2010/main" xmlns="" w="9525">
+                  <a14:hiddenLine xmlns="" xmlns:p14="http://schemas.microsoft.com/office/powerpoint/2010/main" xmlns:a14="http://schemas.microsoft.com/office/drawing/2010/main" w="9525">
                     <a:solidFill>
                       <a:srgbClr val="000000"/>
                     </a:solidFill>
@@ -14030,7 +13879,7 @@
               </a:ln>
               <a:extLst>
                 <a:ext uri="{91240B29-F687-4f45-9708-019B960494DF}">
-                  <a14:hiddenLine xmlns:a14="http://schemas.microsoft.com/office/drawing/2010/main" xmlns:p14="http://schemas.microsoft.com/office/powerpoint/2010/main" xmlns="" w="9525">
+                  <a14:hiddenLine xmlns="" xmlns:p14="http://schemas.microsoft.com/office/powerpoint/2010/main" xmlns:a14="http://schemas.microsoft.com/office/drawing/2010/main" w="9525">
                     <a:solidFill>
                       <a:srgbClr val="000000"/>
                     </a:solidFill>
@@ -14107,7 +13956,7 @@
               </a:ln>
               <a:extLst>
                 <a:ext uri="{91240B29-F687-4f45-9708-019B960494DF}">
-                  <a14:hiddenLine xmlns:a14="http://schemas.microsoft.com/office/drawing/2010/main" xmlns:p14="http://schemas.microsoft.com/office/powerpoint/2010/main" xmlns="" w="9525">
+                  <a14:hiddenLine xmlns="" xmlns:p14="http://schemas.microsoft.com/office/powerpoint/2010/main" xmlns:a14="http://schemas.microsoft.com/office/drawing/2010/main" w="9525">
                     <a:solidFill>
                       <a:srgbClr val="000000"/>
                     </a:solidFill>
@@ -14184,7 +14033,7 @@
               </a:ln>
               <a:extLst>
                 <a:ext uri="{91240B29-F687-4f45-9708-019B960494DF}">
-                  <a14:hiddenLine xmlns:a14="http://schemas.microsoft.com/office/drawing/2010/main" xmlns:p14="http://schemas.microsoft.com/office/powerpoint/2010/main" xmlns="" w="9525">
+                  <a14:hiddenLine xmlns="" xmlns:p14="http://schemas.microsoft.com/office/powerpoint/2010/main" xmlns:a14="http://schemas.microsoft.com/office/drawing/2010/main" w="9525">
                     <a:solidFill>
                       <a:srgbClr val="000000"/>
                     </a:solidFill>
@@ -14289,7 +14138,7 @@
               </a:ln>
               <a:extLst>
                 <a:ext uri="{91240B29-F687-4f45-9708-019B960494DF}">
-                  <a14:hiddenLine xmlns:a14="http://schemas.microsoft.com/office/drawing/2010/main" xmlns:p14="http://schemas.microsoft.com/office/powerpoint/2010/main" xmlns="" w="9525">
+                  <a14:hiddenLine xmlns="" xmlns:p14="http://schemas.microsoft.com/office/powerpoint/2010/main" xmlns:a14="http://schemas.microsoft.com/office/drawing/2010/main" w="9525">
                     <a:solidFill>
                       <a:srgbClr val="000000"/>
                     </a:solidFill>
@@ -14394,7 +14243,7 @@
               </a:ln>
               <a:extLst>
                 <a:ext uri="{91240B29-F687-4f45-9708-019B960494DF}">
-                  <a14:hiddenLine xmlns:a14="http://schemas.microsoft.com/office/drawing/2010/main" xmlns:p14="http://schemas.microsoft.com/office/powerpoint/2010/main" xmlns="" w="9525">
+                  <a14:hiddenLine xmlns="" xmlns:p14="http://schemas.microsoft.com/office/powerpoint/2010/main" xmlns:a14="http://schemas.microsoft.com/office/drawing/2010/main" w="9525">
                     <a:solidFill>
                       <a:srgbClr val="000000"/>
                     </a:solidFill>
@@ -14471,7 +14320,7 @@
               </a:ln>
               <a:extLst>
                 <a:ext uri="{91240B29-F687-4f45-9708-019B960494DF}">
-                  <a14:hiddenLine xmlns:a14="http://schemas.microsoft.com/office/drawing/2010/main" xmlns:p14="http://schemas.microsoft.com/office/powerpoint/2010/main" xmlns="" w="9525">
+                  <a14:hiddenLine xmlns="" xmlns:p14="http://schemas.microsoft.com/office/powerpoint/2010/main" xmlns:a14="http://schemas.microsoft.com/office/drawing/2010/main" w="9525">
                     <a:solidFill>
                       <a:srgbClr val="000000"/>
                     </a:solidFill>
@@ -14596,7 +14445,7 @@
               </a:ln>
               <a:extLst>
                 <a:ext uri="{91240B29-F687-4f45-9708-019B960494DF}">
-                  <a14:hiddenLine xmlns:a14="http://schemas.microsoft.com/office/drawing/2010/main" xmlns:p14="http://schemas.microsoft.com/office/powerpoint/2010/main" xmlns="" w="9525">
+                  <a14:hiddenLine xmlns="" xmlns:p14="http://schemas.microsoft.com/office/powerpoint/2010/main" xmlns:a14="http://schemas.microsoft.com/office/drawing/2010/main" w="9525">
                     <a:solidFill>
                       <a:srgbClr val="000000"/>
                     </a:solidFill>
@@ -14710,7 +14559,7 @@
               </a:ln>
               <a:extLst>
                 <a:ext uri="{91240B29-F687-4f45-9708-019B960494DF}">
-                  <a14:hiddenLine xmlns:a14="http://schemas.microsoft.com/office/drawing/2010/main" xmlns:p14="http://schemas.microsoft.com/office/powerpoint/2010/main" xmlns="" w="9525">
+                  <a14:hiddenLine xmlns="" xmlns:p14="http://schemas.microsoft.com/office/powerpoint/2010/main" xmlns:a14="http://schemas.microsoft.com/office/drawing/2010/main" w="9525">
                     <a:solidFill>
                       <a:srgbClr val="000000"/>
                     </a:solidFill>
@@ -14787,7 +14636,7 @@
               </a:ln>
               <a:extLst>
                 <a:ext uri="{91240B29-F687-4f45-9708-019B960494DF}">
-                  <a14:hiddenLine xmlns:a14="http://schemas.microsoft.com/office/drawing/2010/main" xmlns:p14="http://schemas.microsoft.com/office/powerpoint/2010/main" xmlns="" w="9525">
+                  <a14:hiddenLine xmlns="" xmlns:p14="http://schemas.microsoft.com/office/powerpoint/2010/main" xmlns:a14="http://schemas.microsoft.com/office/drawing/2010/main" w="9525">
                     <a:solidFill>
                       <a:srgbClr val="000000"/>
                     </a:solidFill>
@@ -14864,7 +14713,7 @@
               </a:ln>
               <a:extLst>
                 <a:ext uri="{91240B29-F687-4f45-9708-019B960494DF}">
-                  <a14:hiddenLine xmlns:a14="http://schemas.microsoft.com/office/drawing/2010/main" xmlns:p14="http://schemas.microsoft.com/office/powerpoint/2010/main" xmlns="" w="9525">
+                  <a14:hiddenLine xmlns="" xmlns:p14="http://schemas.microsoft.com/office/powerpoint/2010/main" xmlns:a14="http://schemas.microsoft.com/office/drawing/2010/main" w="9525">
                     <a:solidFill>
                       <a:srgbClr val="000000"/>
                     </a:solidFill>
@@ -14969,7 +14818,7 @@
               </a:ln>
               <a:extLst>
                 <a:ext uri="{91240B29-F687-4f45-9708-019B960494DF}">
-                  <a14:hiddenLine xmlns:a14="http://schemas.microsoft.com/office/drawing/2010/main" xmlns:p14="http://schemas.microsoft.com/office/powerpoint/2010/main" xmlns="" w="9525">
+                  <a14:hiddenLine xmlns="" xmlns:p14="http://schemas.microsoft.com/office/powerpoint/2010/main" xmlns:a14="http://schemas.microsoft.com/office/drawing/2010/main" w="9525">
                     <a:solidFill>
                       <a:srgbClr val="000000"/>
                     </a:solidFill>
@@ -15018,7 +14867,7 @@
               </a:ln>
               <a:extLst>
                 <a:ext uri="{91240B29-F687-4f45-9708-019B960494DF}">
-                  <a14:hiddenLine xmlns:a14="http://schemas.microsoft.com/office/drawing/2010/main" xmlns:p14="http://schemas.microsoft.com/office/powerpoint/2010/main" xmlns="" w="9525">
+                  <a14:hiddenLine xmlns="" xmlns:p14="http://schemas.microsoft.com/office/powerpoint/2010/main" xmlns:a14="http://schemas.microsoft.com/office/drawing/2010/main" w="9525">
                     <a:solidFill>
                       <a:srgbClr val="000000"/>
                     </a:solidFill>
@@ -15098,7 +14947,7 @@
               </a:ln>
               <a:extLst>
                 <a:ext uri="{91240B29-F687-4f45-9708-019B960494DF}">
-                  <a14:hiddenLine xmlns:a14="http://schemas.microsoft.com/office/drawing/2010/main" xmlns:p14="http://schemas.microsoft.com/office/powerpoint/2010/main" xmlns="" w="9525">
+                  <a14:hiddenLine xmlns="" xmlns:p14="http://schemas.microsoft.com/office/powerpoint/2010/main" xmlns:a14="http://schemas.microsoft.com/office/drawing/2010/main" w="9525">
                     <a:solidFill>
                       <a:srgbClr val="000000"/>
                     </a:solidFill>
@@ -15203,7 +15052,7 @@
               </a:ln>
               <a:extLst>
                 <a:ext uri="{91240B29-F687-4f45-9708-019B960494DF}">
-                  <a14:hiddenLine xmlns:a14="http://schemas.microsoft.com/office/drawing/2010/main" xmlns:p14="http://schemas.microsoft.com/office/powerpoint/2010/main" xmlns="" w="9525">
+                  <a14:hiddenLine xmlns="" xmlns:p14="http://schemas.microsoft.com/office/powerpoint/2010/main" xmlns:a14="http://schemas.microsoft.com/office/drawing/2010/main" w="9525">
                     <a:solidFill>
                       <a:srgbClr val="000000"/>
                     </a:solidFill>
@@ -15280,7 +15129,7 @@
               </a:ln>
               <a:extLst>
                 <a:ext uri="{91240B29-F687-4f45-9708-019B960494DF}">
-                  <a14:hiddenLine xmlns:a14="http://schemas.microsoft.com/office/drawing/2010/main" xmlns:p14="http://schemas.microsoft.com/office/powerpoint/2010/main" xmlns="" w="9525">
+                  <a14:hiddenLine xmlns="" xmlns:p14="http://schemas.microsoft.com/office/powerpoint/2010/main" xmlns:a14="http://schemas.microsoft.com/office/drawing/2010/main" w="9525">
                     <a:solidFill>
                       <a:srgbClr val="000000"/>
                     </a:solidFill>
@@ -15385,7 +15234,7 @@
               </a:ln>
               <a:extLst>
                 <a:ext uri="{91240B29-F687-4f45-9708-019B960494DF}">
-                  <a14:hiddenLine xmlns:a14="http://schemas.microsoft.com/office/drawing/2010/main" xmlns:p14="http://schemas.microsoft.com/office/powerpoint/2010/main" xmlns="" w="9525">
+                  <a14:hiddenLine xmlns="" xmlns:p14="http://schemas.microsoft.com/office/powerpoint/2010/main" xmlns:a14="http://schemas.microsoft.com/office/drawing/2010/main" w="9525">
                     <a:solidFill>
                       <a:srgbClr val="000000"/>
                     </a:solidFill>
@@ -15465,7 +15314,7 @@
               </a:ln>
               <a:extLst>
                 <a:ext uri="{91240B29-F687-4f45-9708-019B960494DF}">
-                  <a14:hiddenLine xmlns:a14="http://schemas.microsoft.com/office/drawing/2010/main" xmlns:p14="http://schemas.microsoft.com/office/powerpoint/2010/main" xmlns="" w="9525">
+                  <a14:hiddenLine xmlns="" xmlns:p14="http://schemas.microsoft.com/office/powerpoint/2010/main" xmlns:a14="http://schemas.microsoft.com/office/drawing/2010/main" w="9525">
                     <a:solidFill>
                       <a:srgbClr val="000000"/>
                     </a:solidFill>
@@ -15542,7 +15391,7 @@
               </a:ln>
               <a:extLst>
                 <a:ext uri="{91240B29-F687-4f45-9708-019B960494DF}">
-                  <a14:hiddenLine xmlns:a14="http://schemas.microsoft.com/office/drawing/2010/main" xmlns:p14="http://schemas.microsoft.com/office/powerpoint/2010/main" xmlns="" w="9525">
+                  <a14:hiddenLine xmlns="" xmlns:p14="http://schemas.microsoft.com/office/powerpoint/2010/main" xmlns:a14="http://schemas.microsoft.com/office/drawing/2010/main" w="9525">
                     <a:solidFill>
                       <a:srgbClr val="000000"/>
                     </a:solidFill>
@@ -15647,7 +15496,7 @@
               </a:ln>
               <a:extLst>
                 <a:ext uri="{91240B29-F687-4f45-9708-019B960494DF}">
-                  <a14:hiddenLine xmlns:a14="http://schemas.microsoft.com/office/drawing/2010/main" xmlns:p14="http://schemas.microsoft.com/office/powerpoint/2010/main" xmlns="" w="9525">
+                  <a14:hiddenLine xmlns="" xmlns:p14="http://schemas.microsoft.com/office/powerpoint/2010/main" xmlns:a14="http://schemas.microsoft.com/office/drawing/2010/main" w="9525">
                     <a:solidFill>
                       <a:srgbClr val="000000"/>
                     </a:solidFill>
@@ -15752,7 +15601,7 @@
               </a:ln>
               <a:extLst>
                 <a:ext uri="{91240B29-F687-4f45-9708-019B960494DF}">
-                  <a14:hiddenLine xmlns:a14="http://schemas.microsoft.com/office/drawing/2010/main" xmlns:p14="http://schemas.microsoft.com/office/powerpoint/2010/main" xmlns="" w="9525">
+                  <a14:hiddenLine xmlns="" xmlns:p14="http://schemas.microsoft.com/office/powerpoint/2010/main" xmlns:a14="http://schemas.microsoft.com/office/drawing/2010/main" w="9525">
                     <a:solidFill>
                       <a:srgbClr val="000000"/>
                     </a:solidFill>
@@ -15832,7 +15681,7 @@
               </a:ln>
               <a:extLst>
                 <a:ext uri="{91240B29-F687-4f45-9708-019B960494DF}">
-                  <a14:hiddenLine xmlns:a14="http://schemas.microsoft.com/office/drawing/2010/main" xmlns:p14="http://schemas.microsoft.com/office/powerpoint/2010/main" xmlns="" w="9525">
+                  <a14:hiddenLine xmlns="" xmlns:p14="http://schemas.microsoft.com/office/powerpoint/2010/main" xmlns:a14="http://schemas.microsoft.com/office/drawing/2010/main" w="9525">
                     <a:solidFill>
                       <a:srgbClr val="000000"/>
                     </a:solidFill>
@@ -15967,7 +15816,7 @@
               </a:ln>
               <a:extLst>
                 <a:ext uri="{91240B29-F687-4f45-9708-019B960494DF}">
-                  <a14:hiddenLine xmlns:a14="http://schemas.microsoft.com/office/drawing/2010/main" xmlns:p14="http://schemas.microsoft.com/office/powerpoint/2010/main" xmlns="" w="9525">
+                  <a14:hiddenLine xmlns="" xmlns:p14="http://schemas.microsoft.com/office/powerpoint/2010/main" xmlns:a14="http://schemas.microsoft.com/office/drawing/2010/main" w="9525">
                     <a:solidFill>
                       <a:srgbClr val="000000"/>
                     </a:solidFill>
@@ -16078,7 +15927,7 @@
               </a:ln>
               <a:extLst>
                 <a:ext uri="{91240B29-F687-4f45-9708-019B960494DF}">
-                  <a14:hiddenLine xmlns:a14="http://schemas.microsoft.com/office/drawing/2010/main" xmlns:p14="http://schemas.microsoft.com/office/powerpoint/2010/main" xmlns="" w="9525">
+                  <a14:hiddenLine xmlns="" xmlns:p14="http://schemas.microsoft.com/office/powerpoint/2010/main" xmlns:a14="http://schemas.microsoft.com/office/drawing/2010/main" w="9525">
                     <a:solidFill>
                       <a:srgbClr val="000000"/>
                     </a:solidFill>
@@ -16208,7 +16057,7 @@
               </a:ln>
               <a:extLst>
                 <a:ext uri="{91240B29-F687-4f45-9708-019B960494DF}">
-                  <a14:hiddenLine xmlns:a14="http://schemas.microsoft.com/office/drawing/2010/main" xmlns:p14="http://schemas.microsoft.com/office/powerpoint/2010/main" xmlns="" w="9525">
+                  <a14:hiddenLine xmlns="" xmlns:p14="http://schemas.microsoft.com/office/powerpoint/2010/main" xmlns:a14="http://schemas.microsoft.com/office/drawing/2010/main" w="9525">
                     <a:solidFill>
                       <a:srgbClr val="000000"/>
                     </a:solidFill>
@@ -16313,7 +16162,7 @@
               </a:ln>
               <a:extLst>
                 <a:ext uri="{91240B29-F687-4f45-9708-019B960494DF}">
-                  <a14:hiddenLine xmlns:a14="http://schemas.microsoft.com/office/drawing/2010/main" xmlns:p14="http://schemas.microsoft.com/office/powerpoint/2010/main" xmlns="" w="9525">
+                  <a14:hiddenLine xmlns="" xmlns:p14="http://schemas.microsoft.com/office/powerpoint/2010/main" xmlns:a14="http://schemas.microsoft.com/office/drawing/2010/main" w="9525">
                     <a:solidFill>
                       <a:srgbClr val="000000"/>
                     </a:solidFill>
@@ -16393,7 +16242,7 @@
               </a:ln>
               <a:extLst>
                 <a:ext uri="{91240B29-F687-4f45-9708-019B960494DF}">
-                  <a14:hiddenLine xmlns:a14="http://schemas.microsoft.com/office/drawing/2010/main" xmlns:p14="http://schemas.microsoft.com/office/powerpoint/2010/main" xmlns="" w="9525">
+                  <a14:hiddenLine xmlns="" xmlns:p14="http://schemas.microsoft.com/office/powerpoint/2010/main" xmlns:a14="http://schemas.microsoft.com/office/drawing/2010/main" w="9525">
                     <a:solidFill>
                       <a:srgbClr val="000000"/>
                     </a:solidFill>
@@ -16498,7 +16347,7 @@
               </a:ln>
               <a:extLst>
                 <a:ext uri="{91240B29-F687-4f45-9708-019B960494DF}">
-                  <a14:hiddenLine xmlns:a14="http://schemas.microsoft.com/office/drawing/2010/main" xmlns:p14="http://schemas.microsoft.com/office/powerpoint/2010/main" xmlns="" w="9525">
+                  <a14:hiddenLine xmlns="" xmlns:p14="http://schemas.microsoft.com/office/powerpoint/2010/main" xmlns:a14="http://schemas.microsoft.com/office/drawing/2010/main" w="9525">
                     <a:solidFill>
                       <a:srgbClr val="000000"/>
                     </a:solidFill>
@@ -16581,7 +16430,7 @@
               </a:ln>
               <a:extLst>
                 <a:ext uri="{91240B29-F687-4f45-9708-019B960494DF}">
-                  <a14:hiddenLine xmlns:a14="http://schemas.microsoft.com/office/drawing/2010/main" xmlns:p14="http://schemas.microsoft.com/office/powerpoint/2010/main" xmlns="" w="9525">
+                  <a14:hiddenLine xmlns="" xmlns:p14="http://schemas.microsoft.com/office/powerpoint/2010/main" xmlns:a14="http://schemas.microsoft.com/office/drawing/2010/main" w="9525">
                     <a:solidFill>
                       <a:srgbClr val="000000"/>
                     </a:solidFill>
@@ -16686,7 +16535,7 @@
               </a:ln>
               <a:extLst>
                 <a:ext uri="{91240B29-F687-4f45-9708-019B960494DF}">
-                  <a14:hiddenLine xmlns:a14="http://schemas.microsoft.com/office/drawing/2010/main" xmlns:p14="http://schemas.microsoft.com/office/powerpoint/2010/main" xmlns="" w="9525">
+                  <a14:hiddenLine xmlns="" xmlns:p14="http://schemas.microsoft.com/office/powerpoint/2010/main" xmlns:a14="http://schemas.microsoft.com/office/drawing/2010/main" w="9525">
                     <a:solidFill>
                       <a:srgbClr val="000000"/>
                     </a:solidFill>
@@ -16769,7 +16618,7 @@
               </a:ln>
               <a:extLst>
                 <a:ext uri="{91240B29-F687-4f45-9708-019B960494DF}">
-                  <a14:hiddenLine xmlns:a14="http://schemas.microsoft.com/office/drawing/2010/main" xmlns:p14="http://schemas.microsoft.com/office/powerpoint/2010/main" xmlns="" w="9525">
+                  <a14:hiddenLine xmlns="" xmlns:p14="http://schemas.microsoft.com/office/powerpoint/2010/main" xmlns:a14="http://schemas.microsoft.com/office/drawing/2010/main" w="9525">
                     <a:solidFill>
                       <a:srgbClr val="000000"/>
                     </a:solidFill>
@@ -16874,7 +16723,7 @@
               </a:ln>
               <a:extLst>
                 <a:ext uri="{91240B29-F687-4f45-9708-019B960494DF}">
-                  <a14:hiddenLine xmlns:a14="http://schemas.microsoft.com/office/drawing/2010/main" xmlns:p14="http://schemas.microsoft.com/office/powerpoint/2010/main" xmlns="" w="9525">
+                  <a14:hiddenLine xmlns="" xmlns:p14="http://schemas.microsoft.com/office/powerpoint/2010/main" xmlns:a14="http://schemas.microsoft.com/office/drawing/2010/main" w="9525">
                     <a:solidFill>
                       <a:srgbClr val="000000"/>
                     </a:solidFill>
@@ -16923,7 +16772,7 @@
               </a:ln>
               <a:extLst>
                 <a:ext uri="{91240B29-F687-4f45-9708-019B960494DF}">
-                  <a14:hiddenLine xmlns:a14="http://schemas.microsoft.com/office/drawing/2010/main" xmlns:p14="http://schemas.microsoft.com/office/powerpoint/2010/main" xmlns="" w="9525">
+                  <a14:hiddenLine xmlns="" xmlns:p14="http://schemas.microsoft.com/office/powerpoint/2010/main" xmlns:a14="http://schemas.microsoft.com/office/drawing/2010/main" w="9525">
                     <a:solidFill>
                       <a:srgbClr val="000000"/>
                     </a:solidFill>
@@ -17081,7 +16930,7 @@
             <a:noFill/>
             <a:extLst>
               <a:ext uri="{909E8E84-426E-40dd-AFC4-6F175D3DCCD1}">
-                <a14:hiddenFill xmlns:a14="http://schemas.microsoft.com/office/drawing/2010/main" xmlns:p14="http://schemas.microsoft.com/office/powerpoint/2010/main" xmlns="">
+                <a14:hiddenFill xmlns="" xmlns:p14="http://schemas.microsoft.com/office/powerpoint/2010/main" xmlns:a14="http://schemas.microsoft.com/office/drawing/2010/main">
                   <a:solidFill>
                     <a:srgbClr val="FFFFFF"/>
                   </a:solidFill>
@@ -17165,7 +17014,7 @@
             </a:ln>
             <a:extLst>
               <a:ext uri="{91240B29-F687-4f45-9708-019B960494DF}">
-                <a14:hiddenLine xmlns:a14="http://schemas.microsoft.com/office/drawing/2010/main" xmlns:p14="http://schemas.microsoft.com/office/powerpoint/2010/main" xmlns="" w="9525">
+                <a14:hiddenLine xmlns="" xmlns:p14="http://schemas.microsoft.com/office/powerpoint/2010/main" xmlns:a14="http://schemas.microsoft.com/office/drawing/2010/main" w="9525">
                   <a:solidFill>
                     <a:srgbClr val="000000"/>
                   </a:solidFill>
@@ -17270,7 +17119,7 @@
             </a:ln>
             <a:extLst>
               <a:ext uri="{91240B29-F687-4f45-9708-019B960494DF}">
-                <a14:hiddenLine xmlns:a14="http://schemas.microsoft.com/office/drawing/2010/main" xmlns:p14="http://schemas.microsoft.com/office/powerpoint/2010/main" xmlns="" w="9525">
+                <a14:hiddenLine xmlns="" xmlns:p14="http://schemas.microsoft.com/office/powerpoint/2010/main" xmlns:a14="http://schemas.microsoft.com/office/drawing/2010/main" w="9525">
                   <a:solidFill>
                     <a:srgbClr val="000000"/>
                   </a:solidFill>
@@ -17375,7 +17224,7 @@
             </a:ln>
             <a:extLst>
               <a:ext uri="{91240B29-F687-4f45-9708-019B960494DF}">
-                <a14:hiddenLine xmlns:a14="http://schemas.microsoft.com/office/drawing/2010/main" xmlns:p14="http://schemas.microsoft.com/office/powerpoint/2010/main" xmlns="" w="9525">
+                <a14:hiddenLine xmlns="" xmlns:p14="http://schemas.microsoft.com/office/powerpoint/2010/main" xmlns:a14="http://schemas.microsoft.com/office/drawing/2010/main" w="9525">
                   <a:solidFill>
                     <a:srgbClr val="000000"/>
                   </a:solidFill>
@@ -17424,7 +17273,7 @@
             </a:ln>
             <a:extLst>
               <a:ext uri="{91240B29-F687-4f45-9708-019B960494DF}">
-                <a14:hiddenLine xmlns:a14="http://schemas.microsoft.com/office/drawing/2010/main" xmlns:p14="http://schemas.microsoft.com/office/powerpoint/2010/main" xmlns="" w="9525">
+                <a14:hiddenLine xmlns="" xmlns:p14="http://schemas.microsoft.com/office/powerpoint/2010/main" xmlns:a14="http://schemas.microsoft.com/office/drawing/2010/main" w="9525">
                   <a:solidFill>
                     <a:srgbClr val="000000"/>
                   </a:solidFill>
@@ -17529,7 +17378,7 @@
             </a:ln>
             <a:extLst>
               <a:ext uri="{91240B29-F687-4f45-9708-019B960494DF}">
-                <a14:hiddenLine xmlns:a14="http://schemas.microsoft.com/office/drawing/2010/main" xmlns:p14="http://schemas.microsoft.com/office/powerpoint/2010/main" xmlns="" w="9525">
+                <a14:hiddenLine xmlns="" xmlns:p14="http://schemas.microsoft.com/office/powerpoint/2010/main" xmlns:a14="http://schemas.microsoft.com/office/drawing/2010/main" w="9525">
                   <a:solidFill>
                     <a:srgbClr val="000000"/>
                   </a:solidFill>
@@ -17606,7 +17455,7 @@
             </a:ln>
             <a:extLst>
               <a:ext uri="{91240B29-F687-4f45-9708-019B960494DF}">
-                <a14:hiddenLine xmlns:a14="http://schemas.microsoft.com/office/drawing/2010/main" xmlns:p14="http://schemas.microsoft.com/office/powerpoint/2010/main" xmlns="" w="9525">
+                <a14:hiddenLine xmlns="" xmlns:p14="http://schemas.microsoft.com/office/powerpoint/2010/main" xmlns:a14="http://schemas.microsoft.com/office/drawing/2010/main" w="9525">
                   <a:solidFill>
                     <a:srgbClr val="000000"/>
                   </a:solidFill>
@@ -17683,7 +17532,7 @@
             </a:ln>
             <a:extLst>
               <a:ext uri="{91240B29-F687-4f45-9708-019B960494DF}">
-                <a14:hiddenLine xmlns:a14="http://schemas.microsoft.com/office/drawing/2010/main" xmlns:p14="http://schemas.microsoft.com/office/powerpoint/2010/main" xmlns="" w="9525">
+                <a14:hiddenLine xmlns="" xmlns:p14="http://schemas.microsoft.com/office/powerpoint/2010/main" xmlns:a14="http://schemas.microsoft.com/office/drawing/2010/main" w="9525">
                   <a:solidFill>
                     <a:srgbClr val="000000"/>
                   </a:solidFill>
@@ -17788,7 +17637,7 @@
             </a:ln>
             <a:extLst>
               <a:ext uri="{91240B29-F687-4f45-9708-019B960494DF}">
-                <a14:hiddenLine xmlns:a14="http://schemas.microsoft.com/office/drawing/2010/main" xmlns:p14="http://schemas.microsoft.com/office/powerpoint/2010/main" xmlns="" w="9525">
+                <a14:hiddenLine xmlns="" xmlns:p14="http://schemas.microsoft.com/office/powerpoint/2010/main" xmlns:a14="http://schemas.microsoft.com/office/drawing/2010/main" w="9525">
                   <a:solidFill>
                     <a:srgbClr val="000000"/>
                   </a:solidFill>
@@ -17865,7 +17714,7 @@
             </a:ln>
             <a:extLst>
               <a:ext uri="{91240B29-F687-4f45-9708-019B960494DF}">
-                <a14:hiddenLine xmlns:a14="http://schemas.microsoft.com/office/drawing/2010/main" xmlns:p14="http://schemas.microsoft.com/office/powerpoint/2010/main" xmlns="" w="9525">
+                <a14:hiddenLine xmlns="" xmlns:p14="http://schemas.microsoft.com/office/powerpoint/2010/main" xmlns:a14="http://schemas.microsoft.com/office/drawing/2010/main" w="9525">
                   <a:solidFill>
                     <a:srgbClr val="000000"/>
                   </a:solidFill>
@@ -17942,7 +17791,7 @@
             </a:ln>
             <a:extLst>
               <a:ext uri="{91240B29-F687-4f45-9708-019B960494DF}">
-                <a14:hiddenLine xmlns:a14="http://schemas.microsoft.com/office/drawing/2010/main" xmlns:p14="http://schemas.microsoft.com/office/powerpoint/2010/main" xmlns="" w="9525">
+                <a14:hiddenLine xmlns="" xmlns:p14="http://schemas.microsoft.com/office/powerpoint/2010/main" xmlns:a14="http://schemas.microsoft.com/office/drawing/2010/main" w="9525">
                   <a:solidFill>
                     <a:srgbClr val="000000"/>
                   </a:solidFill>
@@ -18047,7 +17896,7 @@
             </a:ln>
             <a:extLst>
               <a:ext uri="{91240B29-F687-4f45-9708-019B960494DF}">
-                <a14:hiddenLine xmlns:a14="http://schemas.microsoft.com/office/drawing/2010/main" xmlns:p14="http://schemas.microsoft.com/office/powerpoint/2010/main" xmlns="" w="9525">
+                <a14:hiddenLine xmlns="" xmlns:p14="http://schemas.microsoft.com/office/powerpoint/2010/main" xmlns:a14="http://schemas.microsoft.com/office/drawing/2010/main" w="9525">
                   <a:solidFill>
                     <a:srgbClr val="000000"/>
                   </a:solidFill>
@@ -18152,7 +18001,7 @@
             </a:ln>
             <a:extLst>
               <a:ext uri="{91240B29-F687-4f45-9708-019B960494DF}">
-                <a14:hiddenLine xmlns:a14="http://schemas.microsoft.com/office/drawing/2010/main" xmlns:p14="http://schemas.microsoft.com/office/powerpoint/2010/main" xmlns="" w="9525">
+                <a14:hiddenLine xmlns="" xmlns:p14="http://schemas.microsoft.com/office/powerpoint/2010/main" xmlns:a14="http://schemas.microsoft.com/office/drawing/2010/main" w="9525">
                   <a:solidFill>
                     <a:srgbClr val="000000"/>
                   </a:solidFill>
@@ -18229,7 +18078,7 @@
             </a:ln>
             <a:extLst>
               <a:ext uri="{91240B29-F687-4f45-9708-019B960494DF}">
-                <a14:hiddenLine xmlns:a14="http://schemas.microsoft.com/office/drawing/2010/main" xmlns:p14="http://schemas.microsoft.com/office/powerpoint/2010/main" xmlns="" w="9525">
+                <a14:hiddenLine xmlns="" xmlns:p14="http://schemas.microsoft.com/office/powerpoint/2010/main" xmlns:a14="http://schemas.microsoft.com/office/drawing/2010/main" w="9525">
                   <a:solidFill>
                     <a:srgbClr val="000000"/>
                   </a:solidFill>
@@ -18354,7 +18203,7 @@
             </a:ln>
             <a:extLst>
               <a:ext uri="{91240B29-F687-4f45-9708-019B960494DF}">
-                <a14:hiddenLine xmlns:a14="http://schemas.microsoft.com/office/drawing/2010/main" xmlns:p14="http://schemas.microsoft.com/office/powerpoint/2010/main" xmlns="" w="9525">
+                <a14:hiddenLine xmlns="" xmlns:p14="http://schemas.microsoft.com/office/powerpoint/2010/main" xmlns:a14="http://schemas.microsoft.com/office/drawing/2010/main" w="9525">
                   <a:solidFill>
                     <a:srgbClr val="000000"/>
                   </a:solidFill>
@@ -18431,7 +18280,7 @@
             </a:ln>
             <a:extLst>
               <a:ext uri="{91240B29-F687-4f45-9708-019B960494DF}">
-                <a14:hiddenLine xmlns:a14="http://schemas.microsoft.com/office/drawing/2010/main" xmlns:p14="http://schemas.microsoft.com/office/powerpoint/2010/main" xmlns="" w="9525">
+                <a14:hiddenLine xmlns="" xmlns:p14="http://schemas.microsoft.com/office/powerpoint/2010/main" xmlns:a14="http://schemas.microsoft.com/office/drawing/2010/main" w="9525">
                   <a:solidFill>
                     <a:srgbClr val="000000"/>
                   </a:solidFill>
@@ -18536,7 +18385,7 @@
             </a:ln>
             <a:extLst>
               <a:ext uri="{91240B29-F687-4f45-9708-019B960494DF}">
-                <a14:hiddenLine xmlns:a14="http://schemas.microsoft.com/office/drawing/2010/main" xmlns:p14="http://schemas.microsoft.com/office/powerpoint/2010/main" xmlns="" w="9525">
+                <a14:hiddenLine xmlns="" xmlns:p14="http://schemas.microsoft.com/office/powerpoint/2010/main" xmlns:a14="http://schemas.microsoft.com/office/drawing/2010/main" w="9525">
                   <a:solidFill>
                     <a:srgbClr val="000000"/>
                   </a:solidFill>
@@ -18641,7 +18490,7 @@
             </a:ln>
             <a:extLst>
               <a:ext uri="{91240B29-F687-4f45-9708-019B960494DF}">
-                <a14:hiddenLine xmlns:a14="http://schemas.microsoft.com/office/drawing/2010/main" xmlns:p14="http://schemas.microsoft.com/office/powerpoint/2010/main" xmlns="" w="9525">
+                <a14:hiddenLine xmlns="" xmlns:p14="http://schemas.microsoft.com/office/powerpoint/2010/main" xmlns:a14="http://schemas.microsoft.com/office/drawing/2010/main" w="9525">
                   <a:solidFill>
                     <a:srgbClr val="000000"/>
                   </a:solidFill>
@@ -18718,7 +18567,7 @@
             </a:ln>
             <a:extLst>
               <a:ext uri="{91240B29-F687-4f45-9708-019B960494DF}">
-                <a14:hiddenLine xmlns:a14="http://schemas.microsoft.com/office/drawing/2010/main" xmlns:p14="http://schemas.microsoft.com/office/powerpoint/2010/main" xmlns="" w="9525">
+                <a14:hiddenLine xmlns="" xmlns:p14="http://schemas.microsoft.com/office/powerpoint/2010/main" xmlns:a14="http://schemas.microsoft.com/office/drawing/2010/main" w="9525">
                   <a:solidFill>
                     <a:srgbClr val="000000"/>
                   </a:solidFill>
@@ -18823,7 +18672,7 @@
             </a:ln>
             <a:extLst>
               <a:ext uri="{91240B29-F687-4f45-9708-019B960494DF}">
-                <a14:hiddenLine xmlns:a14="http://schemas.microsoft.com/office/drawing/2010/main" xmlns:p14="http://schemas.microsoft.com/office/powerpoint/2010/main" xmlns="" w="9525">
+                <a14:hiddenLine xmlns="" xmlns:p14="http://schemas.microsoft.com/office/powerpoint/2010/main" xmlns:a14="http://schemas.microsoft.com/office/drawing/2010/main" w="9525">
                   <a:solidFill>
                     <a:srgbClr val="000000"/>
                   </a:solidFill>
@@ -18928,7 +18777,7 @@
             </a:ln>
             <a:extLst>
               <a:ext uri="{91240B29-F687-4f45-9708-019B960494DF}">
-                <a14:hiddenLine xmlns:a14="http://schemas.microsoft.com/office/drawing/2010/main" xmlns:p14="http://schemas.microsoft.com/office/powerpoint/2010/main" xmlns="" w="9525">
+                <a14:hiddenLine xmlns="" xmlns:p14="http://schemas.microsoft.com/office/powerpoint/2010/main" xmlns:a14="http://schemas.microsoft.com/office/drawing/2010/main" w="9525">
                   <a:solidFill>
                     <a:srgbClr val="000000"/>
                   </a:solidFill>
@@ -18999,7 +18848,7 @@
             </a:ln>
             <a:extLst>
               <a:ext uri="{91240B29-F687-4f45-9708-019B960494DF}">
-                <a14:hiddenLine xmlns:a14="http://schemas.microsoft.com/office/drawing/2010/main" xmlns:p14="http://schemas.microsoft.com/office/powerpoint/2010/main" xmlns="" w="9525">
+                <a14:hiddenLine xmlns="" xmlns:p14="http://schemas.microsoft.com/office/powerpoint/2010/main" xmlns:a14="http://schemas.microsoft.com/office/drawing/2010/main" w="9525">
                   <a:solidFill>
                     <a:srgbClr val="000000"/>
                   </a:solidFill>
@@ -19104,7 +18953,7 @@
             </a:ln>
             <a:extLst>
               <a:ext uri="{91240B29-F687-4f45-9708-019B960494DF}">
-                <a14:hiddenLine xmlns:a14="http://schemas.microsoft.com/office/drawing/2010/main" xmlns:p14="http://schemas.microsoft.com/office/powerpoint/2010/main" xmlns="" w="9525">
+                <a14:hiddenLine xmlns="" xmlns:p14="http://schemas.microsoft.com/office/powerpoint/2010/main" xmlns:a14="http://schemas.microsoft.com/office/drawing/2010/main" w="9525">
                   <a:solidFill>
                     <a:srgbClr val="000000"/>
                   </a:solidFill>
@@ -19175,7 +19024,7 @@
             </a:ln>
             <a:extLst>
               <a:ext uri="{91240B29-F687-4f45-9708-019B960494DF}">
-                <a14:hiddenLine xmlns:a14="http://schemas.microsoft.com/office/drawing/2010/main" xmlns:p14="http://schemas.microsoft.com/office/powerpoint/2010/main" xmlns="" w="9525">
+                <a14:hiddenLine xmlns="" xmlns:p14="http://schemas.microsoft.com/office/powerpoint/2010/main" xmlns:a14="http://schemas.microsoft.com/office/drawing/2010/main" w="9525">
                   <a:solidFill>
                     <a:srgbClr val="000000"/>
                   </a:solidFill>
@@ -19280,7 +19129,7 @@
             </a:ln>
             <a:extLst>
               <a:ext uri="{91240B29-F687-4f45-9708-019B960494DF}">
-                <a14:hiddenLine xmlns:a14="http://schemas.microsoft.com/office/drawing/2010/main" xmlns:p14="http://schemas.microsoft.com/office/powerpoint/2010/main" xmlns="" w="9525">
+                <a14:hiddenLine xmlns="" xmlns:p14="http://schemas.microsoft.com/office/powerpoint/2010/main" xmlns:a14="http://schemas.microsoft.com/office/drawing/2010/main" w="9525">
                   <a:solidFill>
                     <a:srgbClr val="000000"/>
                   </a:solidFill>
@@ -19363,7 +19212,7 @@
             </a:ln>
             <a:extLst>
               <a:ext uri="{91240B29-F687-4f45-9708-019B960494DF}">
-                <a14:hiddenLine xmlns:a14="http://schemas.microsoft.com/office/drawing/2010/main" xmlns:p14="http://schemas.microsoft.com/office/powerpoint/2010/main" xmlns="" w="9525">
+                <a14:hiddenLine xmlns="" xmlns:p14="http://schemas.microsoft.com/office/powerpoint/2010/main" xmlns:a14="http://schemas.microsoft.com/office/drawing/2010/main" w="9525">
                   <a:solidFill>
                     <a:srgbClr val="000000"/>
                   </a:solidFill>
@@ -19468,7 +19317,7 @@
             </a:ln>
             <a:extLst>
               <a:ext uri="{91240B29-F687-4f45-9708-019B960494DF}">
-                <a14:hiddenLine xmlns:a14="http://schemas.microsoft.com/office/drawing/2010/main" xmlns:p14="http://schemas.microsoft.com/office/powerpoint/2010/main" xmlns="" w="9525">
+                <a14:hiddenLine xmlns="" xmlns:p14="http://schemas.microsoft.com/office/powerpoint/2010/main" xmlns:a14="http://schemas.microsoft.com/office/drawing/2010/main" w="9525">
                   <a:solidFill>
                     <a:srgbClr val="000000"/>
                   </a:solidFill>
@@ -19551,7 +19400,7 @@
             </a:ln>
             <a:extLst>
               <a:ext uri="{91240B29-F687-4f45-9708-019B960494DF}">
-                <a14:hiddenLine xmlns:a14="http://schemas.microsoft.com/office/drawing/2010/main" xmlns:p14="http://schemas.microsoft.com/office/powerpoint/2010/main" xmlns="" w="9525">
+                <a14:hiddenLine xmlns="" xmlns:p14="http://schemas.microsoft.com/office/powerpoint/2010/main" xmlns:a14="http://schemas.microsoft.com/office/drawing/2010/main" w="9525">
                   <a:solidFill>
                     <a:srgbClr val="000000"/>
                   </a:solidFill>
@@ -19656,7 +19505,7 @@
             </a:ln>
             <a:extLst>
               <a:ext uri="{91240B29-F687-4f45-9708-019B960494DF}">
-                <a14:hiddenLine xmlns:a14="http://schemas.microsoft.com/office/drawing/2010/main" xmlns:p14="http://schemas.microsoft.com/office/powerpoint/2010/main" xmlns="" w="9525">
+                <a14:hiddenLine xmlns="" xmlns:p14="http://schemas.microsoft.com/office/powerpoint/2010/main" xmlns:a14="http://schemas.microsoft.com/office/drawing/2010/main" w="9525">
                   <a:solidFill>
                     <a:srgbClr val="000000"/>
                   </a:solidFill>
@@ -19705,7 +19554,7 @@
             </a:ln>
             <a:extLst>
               <a:ext uri="{91240B29-F687-4f45-9708-019B960494DF}">
-                <a14:hiddenLine xmlns:a14="http://schemas.microsoft.com/office/drawing/2010/main" xmlns:p14="http://schemas.microsoft.com/office/powerpoint/2010/main" xmlns="" w="9525">
+                <a14:hiddenLine xmlns="" xmlns:p14="http://schemas.microsoft.com/office/powerpoint/2010/main" xmlns:a14="http://schemas.microsoft.com/office/drawing/2010/main" w="9525">
                   <a:solidFill>
                     <a:srgbClr val="000000"/>
                   </a:solidFill>
@@ -19810,7 +19659,7 @@
             </a:ln>
             <a:extLst>
               <a:ext uri="{91240B29-F687-4f45-9708-019B960494DF}">
-                <a14:hiddenLine xmlns:a14="http://schemas.microsoft.com/office/drawing/2010/main" xmlns:p14="http://schemas.microsoft.com/office/powerpoint/2010/main" xmlns="" w="9525">
+                <a14:hiddenLine xmlns="" xmlns:p14="http://schemas.microsoft.com/office/powerpoint/2010/main" xmlns:a14="http://schemas.microsoft.com/office/drawing/2010/main" w="9525">
                   <a:solidFill>
                     <a:srgbClr val="000000"/>
                   </a:solidFill>
@@ -19887,7 +19736,7 @@
             </a:ln>
             <a:extLst>
               <a:ext uri="{91240B29-F687-4f45-9708-019B960494DF}">
-                <a14:hiddenLine xmlns:a14="http://schemas.microsoft.com/office/drawing/2010/main" xmlns:p14="http://schemas.microsoft.com/office/powerpoint/2010/main" xmlns="" w="9525">
+                <a14:hiddenLine xmlns="" xmlns:p14="http://schemas.microsoft.com/office/powerpoint/2010/main" xmlns:a14="http://schemas.microsoft.com/office/drawing/2010/main" w="9525">
                   <a:solidFill>
                     <a:srgbClr val="000000"/>
                   </a:solidFill>
@@ -19964,7 +19813,7 @@
             </a:ln>
             <a:extLst>
               <a:ext uri="{91240B29-F687-4f45-9708-019B960494DF}">
-                <a14:hiddenLine xmlns:a14="http://schemas.microsoft.com/office/drawing/2010/main" xmlns:p14="http://schemas.microsoft.com/office/powerpoint/2010/main" xmlns="" w="9525">
+                <a14:hiddenLine xmlns="" xmlns:p14="http://schemas.microsoft.com/office/powerpoint/2010/main" xmlns:a14="http://schemas.microsoft.com/office/drawing/2010/main" w="9525">
                   <a:solidFill>
                     <a:srgbClr val="000000"/>
                   </a:solidFill>
@@ -20069,7 +19918,7 @@
             </a:ln>
             <a:extLst>
               <a:ext uri="{91240B29-F687-4f45-9708-019B960494DF}">
-                <a14:hiddenLine xmlns:a14="http://schemas.microsoft.com/office/drawing/2010/main" xmlns:p14="http://schemas.microsoft.com/office/powerpoint/2010/main" xmlns="" w="9525">
+                <a14:hiddenLine xmlns="" xmlns:p14="http://schemas.microsoft.com/office/powerpoint/2010/main" xmlns:a14="http://schemas.microsoft.com/office/drawing/2010/main" w="9525">
                   <a:solidFill>
                     <a:srgbClr val="000000"/>
                   </a:solidFill>
@@ -20152,7 +20001,7 @@
             </a:ln>
             <a:extLst>
               <a:ext uri="{91240B29-F687-4f45-9708-019B960494DF}">
-                <a14:hiddenLine xmlns:a14="http://schemas.microsoft.com/office/drawing/2010/main" xmlns:p14="http://schemas.microsoft.com/office/powerpoint/2010/main" xmlns="" w="9525">
+                <a14:hiddenLine xmlns="" xmlns:p14="http://schemas.microsoft.com/office/powerpoint/2010/main" xmlns:a14="http://schemas.microsoft.com/office/drawing/2010/main" w="9525">
                   <a:solidFill>
                     <a:srgbClr val="000000"/>
                   </a:solidFill>
@@ -20229,7 +20078,7 @@
             </a:ln>
             <a:extLst>
               <a:ext uri="{91240B29-F687-4f45-9708-019B960494DF}">
-                <a14:hiddenLine xmlns:a14="http://schemas.microsoft.com/office/drawing/2010/main" xmlns:p14="http://schemas.microsoft.com/office/powerpoint/2010/main" xmlns="" w="9525">
+                <a14:hiddenLine xmlns="" xmlns:p14="http://schemas.microsoft.com/office/powerpoint/2010/main" xmlns:a14="http://schemas.microsoft.com/office/drawing/2010/main" w="9525">
                   <a:solidFill>
                     <a:srgbClr val="000000"/>
                   </a:solidFill>
@@ -20334,7 +20183,7 @@
             </a:ln>
             <a:extLst>
               <a:ext uri="{91240B29-F687-4f45-9708-019B960494DF}">
-                <a14:hiddenLine xmlns:a14="http://schemas.microsoft.com/office/drawing/2010/main" xmlns:p14="http://schemas.microsoft.com/office/powerpoint/2010/main" xmlns="" w="9525">
+                <a14:hiddenLine xmlns="" xmlns:p14="http://schemas.microsoft.com/office/powerpoint/2010/main" xmlns:a14="http://schemas.microsoft.com/office/drawing/2010/main" w="9525">
                   <a:solidFill>
                     <a:srgbClr val="000000"/>
                   </a:solidFill>
@@ -20411,7 +20260,7 @@
             </a:ln>
             <a:extLst>
               <a:ext uri="{91240B29-F687-4f45-9708-019B960494DF}">
-                <a14:hiddenLine xmlns:a14="http://schemas.microsoft.com/office/drawing/2010/main" xmlns:p14="http://schemas.microsoft.com/office/powerpoint/2010/main" xmlns="" w="9525">
+                <a14:hiddenLine xmlns="" xmlns:p14="http://schemas.microsoft.com/office/powerpoint/2010/main" xmlns:a14="http://schemas.microsoft.com/office/drawing/2010/main" w="9525">
                   <a:solidFill>
                     <a:srgbClr val="000000"/>
                   </a:solidFill>
@@ -20516,7 +20365,7 @@
             </a:ln>
             <a:extLst>
               <a:ext uri="{91240B29-F687-4f45-9708-019B960494DF}">
-                <a14:hiddenLine xmlns:a14="http://schemas.microsoft.com/office/drawing/2010/main" xmlns:p14="http://schemas.microsoft.com/office/powerpoint/2010/main" xmlns="" w="9525">
+                <a14:hiddenLine xmlns="" xmlns:p14="http://schemas.microsoft.com/office/powerpoint/2010/main" xmlns:a14="http://schemas.microsoft.com/office/drawing/2010/main" w="9525">
                   <a:solidFill>
                     <a:srgbClr val="000000"/>
                   </a:solidFill>
@@ -20593,7 +20442,7 @@
             </a:ln>
             <a:extLst>
               <a:ext uri="{91240B29-F687-4f45-9708-019B960494DF}">
-                <a14:hiddenLine xmlns:a14="http://schemas.microsoft.com/office/drawing/2010/main" xmlns:p14="http://schemas.microsoft.com/office/powerpoint/2010/main" xmlns="" w="9525">
+                <a14:hiddenLine xmlns="" xmlns:p14="http://schemas.microsoft.com/office/powerpoint/2010/main" xmlns:a14="http://schemas.microsoft.com/office/drawing/2010/main" w="9525">
                   <a:solidFill>
                     <a:srgbClr val="000000"/>
                   </a:solidFill>
@@ -20698,7 +20547,7 @@
             </a:ln>
             <a:extLst>
               <a:ext uri="{91240B29-F687-4f45-9708-019B960494DF}">
-                <a14:hiddenLine xmlns:a14="http://schemas.microsoft.com/office/drawing/2010/main" xmlns:p14="http://schemas.microsoft.com/office/powerpoint/2010/main" xmlns="" w="9525">
+                <a14:hiddenLine xmlns="" xmlns:p14="http://schemas.microsoft.com/office/powerpoint/2010/main" xmlns:a14="http://schemas.microsoft.com/office/drawing/2010/main" w="9525">
                   <a:solidFill>
                     <a:srgbClr val="000000"/>
                   </a:solidFill>
@@ -20747,7 +20596,7 @@
             </a:ln>
             <a:extLst>
               <a:ext uri="{91240B29-F687-4f45-9708-019B960494DF}">
-                <a14:hiddenLine xmlns:a14="http://schemas.microsoft.com/office/drawing/2010/main" xmlns:p14="http://schemas.microsoft.com/office/powerpoint/2010/main" xmlns="" w="9525">
+                <a14:hiddenLine xmlns="" xmlns:p14="http://schemas.microsoft.com/office/powerpoint/2010/main" xmlns:a14="http://schemas.microsoft.com/office/drawing/2010/main" w="9525">
                   <a:solidFill>
                     <a:srgbClr val="000000"/>
                   </a:solidFill>
@@ -20827,7 +20676,7 @@
             </a:ln>
             <a:extLst>
               <a:ext uri="{91240B29-F687-4f45-9708-019B960494DF}">
-                <a14:hiddenLine xmlns:a14="http://schemas.microsoft.com/office/drawing/2010/main" xmlns:p14="http://schemas.microsoft.com/office/powerpoint/2010/main" xmlns="" w="9525">
+                <a14:hiddenLine xmlns="" xmlns:p14="http://schemas.microsoft.com/office/powerpoint/2010/main" xmlns:a14="http://schemas.microsoft.com/office/drawing/2010/main" w="9525">
                   <a:solidFill>
                     <a:srgbClr val="000000"/>
                   </a:solidFill>
@@ -20932,7 +20781,7 @@
             </a:ln>
             <a:extLst>
               <a:ext uri="{91240B29-F687-4f45-9708-019B960494DF}">
-                <a14:hiddenLine xmlns:a14="http://schemas.microsoft.com/office/drawing/2010/main" xmlns:p14="http://schemas.microsoft.com/office/powerpoint/2010/main" xmlns="" w="9525">
+                <a14:hiddenLine xmlns="" xmlns:p14="http://schemas.microsoft.com/office/powerpoint/2010/main" xmlns:a14="http://schemas.microsoft.com/office/drawing/2010/main" w="9525">
                   <a:solidFill>
                     <a:srgbClr val="000000"/>
                   </a:solidFill>
@@ -21009,7 +20858,7 @@
             </a:ln>
             <a:extLst>
               <a:ext uri="{91240B29-F687-4f45-9708-019B960494DF}">
-                <a14:hiddenLine xmlns:a14="http://schemas.microsoft.com/office/drawing/2010/main" xmlns:p14="http://schemas.microsoft.com/office/powerpoint/2010/main" xmlns="" w="9525">
+                <a14:hiddenLine xmlns="" xmlns:p14="http://schemas.microsoft.com/office/powerpoint/2010/main" xmlns:a14="http://schemas.microsoft.com/office/drawing/2010/main" w="9525">
                   <a:solidFill>
                     <a:srgbClr val="000000"/>
                   </a:solidFill>
@@ -21114,7 +20963,7 @@
             </a:ln>
             <a:extLst>
               <a:ext uri="{91240B29-F687-4f45-9708-019B960494DF}">
-                <a14:hiddenLine xmlns:a14="http://schemas.microsoft.com/office/drawing/2010/main" xmlns:p14="http://schemas.microsoft.com/office/powerpoint/2010/main" xmlns="" w="9525">
+                <a14:hiddenLine xmlns="" xmlns:p14="http://schemas.microsoft.com/office/powerpoint/2010/main" xmlns:a14="http://schemas.microsoft.com/office/drawing/2010/main" w="9525">
                   <a:solidFill>
                     <a:srgbClr val="000000"/>
                   </a:solidFill>
@@ -21219,7 +21068,7 @@
             </a:ln>
             <a:extLst>
               <a:ext uri="{91240B29-F687-4f45-9708-019B960494DF}">
-                <a14:hiddenLine xmlns:a14="http://schemas.microsoft.com/office/drawing/2010/main" xmlns:p14="http://schemas.microsoft.com/office/powerpoint/2010/main" xmlns="" w="9525">
+                <a14:hiddenLine xmlns="" xmlns:p14="http://schemas.microsoft.com/office/powerpoint/2010/main" xmlns:a14="http://schemas.microsoft.com/office/drawing/2010/main" w="9525">
                   <a:solidFill>
                     <a:srgbClr val="000000"/>
                   </a:solidFill>
@@ -21299,7 +21148,7 @@
             </a:ln>
             <a:extLst>
               <a:ext uri="{91240B29-F687-4f45-9708-019B960494DF}">
-                <a14:hiddenLine xmlns:a14="http://schemas.microsoft.com/office/drawing/2010/main" xmlns:p14="http://schemas.microsoft.com/office/powerpoint/2010/main" xmlns="" w="9525">
+                <a14:hiddenLine xmlns="" xmlns:p14="http://schemas.microsoft.com/office/powerpoint/2010/main" xmlns:a14="http://schemas.microsoft.com/office/drawing/2010/main" w="9525">
                   <a:solidFill>
                     <a:srgbClr val="000000"/>
                   </a:solidFill>
@@ -21376,7 +21225,7 @@
             </a:ln>
             <a:extLst>
               <a:ext uri="{91240B29-F687-4f45-9708-019B960494DF}">
-                <a14:hiddenLine xmlns:a14="http://schemas.microsoft.com/office/drawing/2010/main" xmlns:p14="http://schemas.microsoft.com/office/powerpoint/2010/main" xmlns="" w="9525">
+                <a14:hiddenLine xmlns="" xmlns:p14="http://schemas.microsoft.com/office/powerpoint/2010/main" xmlns:a14="http://schemas.microsoft.com/office/drawing/2010/main" w="9525">
                   <a:solidFill>
                     <a:srgbClr val="000000"/>
                   </a:solidFill>
@@ -21481,7 +21330,7 @@
             </a:ln>
             <a:extLst>
               <a:ext uri="{91240B29-F687-4f45-9708-019B960494DF}">
-                <a14:hiddenLine xmlns:a14="http://schemas.microsoft.com/office/drawing/2010/main" xmlns:p14="http://schemas.microsoft.com/office/powerpoint/2010/main" xmlns="" w="9525">
+                <a14:hiddenLine xmlns="" xmlns:p14="http://schemas.microsoft.com/office/powerpoint/2010/main" xmlns:a14="http://schemas.microsoft.com/office/drawing/2010/main" w="9525">
                   <a:solidFill>
                     <a:srgbClr val="000000"/>
                   </a:solidFill>
@@ -21586,7 +21435,7 @@
             </a:ln>
             <a:extLst>
               <a:ext uri="{91240B29-F687-4f45-9708-019B960494DF}">
-                <a14:hiddenLine xmlns:a14="http://schemas.microsoft.com/office/drawing/2010/main" xmlns:p14="http://schemas.microsoft.com/office/powerpoint/2010/main" xmlns="" w="9525">
+                <a14:hiddenLine xmlns="" xmlns:p14="http://schemas.microsoft.com/office/powerpoint/2010/main" xmlns:a14="http://schemas.microsoft.com/office/drawing/2010/main" w="9525">
                   <a:solidFill>
                     <a:srgbClr val="000000"/>
                   </a:solidFill>
@@ -21663,7 +21512,7 @@
             </a:ln>
             <a:extLst>
               <a:ext uri="{91240B29-F687-4f45-9708-019B960494DF}">
-                <a14:hiddenLine xmlns:a14="http://schemas.microsoft.com/office/drawing/2010/main" xmlns:p14="http://schemas.microsoft.com/office/powerpoint/2010/main" xmlns="" w="9525">
+                <a14:hiddenLine xmlns="" xmlns:p14="http://schemas.microsoft.com/office/powerpoint/2010/main" xmlns:a14="http://schemas.microsoft.com/office/drawing/2010/main" w="9525">
                   <a:solidFill>
                     <a:srgbClr val="000000"/>
                   </a:solidFill>
@@ -21798,7 +21647,7 @@
             </a:ln>
             <a:extLst>
               <a:ext uri="{91240B29-F687-4f45-9708-019B960494DF}">
-                <a14:hiddenLine xmlns:a14="http://schemas.microsoft.com/office/drawing/2010/main" xmlns:p14="http://schemas.microsoft.com/office/powerpoint/2010/main" xmlns="" w="9525">
+                <a14:hiddenLine xmlns="" xmlns:p14="http://schemas.microsoft.com/office/powerpoint/2010/main" xmlns:a14="http://schemas.microsoft.com/office/drawing/2010/main" w="9525">
                   <a:solidFill>
                     <a:srgbClr val="000000"/>
                   </a:solidFill>
@@ -21881,7 +21730,7 @@
             </a:ln>
             <a:extLst>
               <a:ext uri="{91240B29-F687-4f45-9708-019B960494DF}">
-                <a14:hiddenLine xmlns:a14="http://schemas.microsoft.com/office/drawing/2010/main" xmlns:p14="http://schemas.microsoft.com/office/powerpoint/2010/main" xmlns="" w="9525">
+                <a14:hiddenLine xmlns="" xmlns:p14="http://schemas.microsoft.com/office/powerpoint/2010/main" xmlns:a14="http://schemas.microsoft.com/office/drawing/2010/main" w="9525">
                   <a:solidFill>
                     <a:srgbClr val="000000"/>
                   </a:solidFill>
@@ -21986,7 +21835,7 @@
             </a:ln>
             <a:extLst>
               <a:ext uri="{91240B29-F687-4f45-9708-019B960494DF}">
-                <a14:hiddenLine xmlns:a14="http://schemas.microsoft.com/office/drawing/2010/main" xmlns:p14="http://schemas.microsoft.com/office/powerpoint/2010/main" xmlns="" w="9525">
+                <a14:hiddenLine xmlns="" xmlns:p14="http://schemas.microsoft.com/office/powerpoint/2010/main" xmlns:a14="http://schemas.microsoft.com/office/drawing/2010/main" w="9525">
                   <a:solidFill>
                     <a:srgbClr val="000000"/>
                   </a:solidFill>
@@ -22466,22 +22315,11 @@
             <p:ph type="title"/>
           </p:nvPr>
         </p:nvSpPr>
-        <p:spPr>
-          <a:xfrm>
-            <a:off x="2235323" y="363277"/>
-            <a:ext cx="5282100" cy="560243"/>
-          </a:xfrm>
-        </p:spPr>
+        <p:spPr/>
         <p:txBody>
-          <a:bodyPr>
-            <a:normAutofit/>
-          </a:bodyPr>
+          <a:bodyPr/>
           <a:lstStyle/>
           <a:p>
-            <a:r>
-              <a:rPr lang="da-DK" sz="2400" dirty="0"/>
-              <a:t>facadecontroller</a:t>
-            </a:r>
             <a:endParaRPr lang="da-DK" dirty="0"/>
           </a:p>
         </p:txBody>
@@ -22511,40 +22349,10 @@
           </a:p>
         </p:txBody>
       </p:sp>
-      <p:pic>
-        <p:nvPicPr>
-          <p:cNvPr id="4" name="Billede 3">
-            <a:extLst>
-              <a:ext uri="{FF2B5EF4-FFF2-40B4-BE49-F238E27FC236}">
-                <a16:creationId xmlns:a16="http://schemas.microsoft.com/office/drawing/2014/main" id="{D983BD81-6E15-4CE5-A2EB-EE6E9795C44A}"/>
-              </a:ext>
-            </a:extLst>
-          </p:cNvPr>
-          <p:cNvPicPr>
-            <a:picLocks noChangeAspect="1"/>
-          </p:cNvPicPr>
-          <p:nvPr/>
-        </p:nvPicPr>
-        <p:blipFill>
-          <a:blip r:embed="rId2"/>
-          <a:stretch>
-            <a:fillRect/>
-          </a:stretch>
-        </p:blipFill>
-        <p:spPr>
-          <a:xfrm>
-            <a:off x="1" y="1178761"/>
-            <a:ext cx="12192000" cy="5679240"/>
-          </a:xfrm>
-          <a:prstGeom prst="rect">
-            <a:avLst/>
-          </a:prstGeom>
-        </p:spPr>
-      </p:pic>
     </p:spTree>
     <p:extLst>
       <p:ext uri="{BB962C8B-B14F-4D97-AF65-F5344CB8AC3E}">
-        <p14:creationId xmlns:p14="http://schemas.microsoft.com/office/powerpoint/2010/main" val="2833078342"/>
+        <p14:creationId xmlns:p14="http://schemas.microsoft.com/office/powerpoint/2010/main" val="3054669827"/>
       </p:ext>
     </p:extLst>
   </p:cSld>

</xml_diff>